<commit_message>
Update Variance of immigrant earnings.pptx
</commit_message>
<xml_diff>
--- a/Variance of immigrant earnings.pptx
+++ b/Variance of immigrant earnings.pptx
@@ -10,12 +10,12 @@
     <p:sldId id="267" r:id="rId4"/>
     <p:sldId id="269" r:id="rId5"/>
     <p:sldId id="270" r:id="rId6"/>
-    <p:sldId id="261" r:id="rId7"/>
+    <p:sldId id="274" r:id="rId7"/>
     <p:sldId id="262" r:id="rId8"/>
     <p:sldId id="263" r:id="rId9"/>
-    <p:sldId id="264" r:id="rId10"/>
-    <p:sldId id="265" r:id="rId11"/>
-    <p:sldId id="271" r:id="rId12"/>
+    <p:sldId id="275" r:id="rId10"/>
+    <p:sldId id="264" r:id="rId11"/>
+    <p:sldId id="265" r:id="rId12"/>
     <p:sldId id="273" r:id="rId13"/>
     <p:sldId id="272" r:id="rId14"/>
     <p:sldId id="259" r:id="rId15"/>
@@ -119,6 +119,50 @@
     </a:lvl9pPr>
   </p:defaultTextStyle>
 </p:presentation>
+</file>
+
+<file path=ppt/revisionInfo.xml><?xml version="1.0" encoding="utf-8"?>
+<p1510:revInfo xmlns:a="http://schemas.openxmlformats.org/drawingml/2006/main" xmlns:r="http://schemas.openxmlformats.org/officeDocument/2006/relationships" xmlns:p1510="http://schemas.microsoft.com/office/powerpoint/2015/10/main">
+  <p1510:revLst>
+    <p1510:client id="{4B9162D4-7552-45FE-9C4D-6997BF1B6B14}" v="1" dt="2019-07-28T21:08:38.793"/>
+  </p1510:revLst>
+</p1510:revInfo>
+</file>
+
+<file path=ppt/changesInfos/changesInfo1.xml><?xml version="1.0" encoding="utf-8"?>
+<pc:chgInfo xmlns:a="http://schemas.openxmlformats.org/drawingml/2006/main" xmlns:r="http://schemas.openxmlformats.org/officeDocument/2006/relationships" xmlns:ac="http://schemas.microsoft.com/office/drawing/2013/main/command" xmlns:pc="http://schemas.microsoft.com/office/powerpoint/2013/main/command">
+  <pc:docChgLst>
+    <pc:chgData name="Atef Alvi" userId="fcbff67b5b76dbca" providerId="LiveId" clId="{B4AF8C3F-FCBF-457B-B1B7-7D54D6A861D5}"/>
+    <pc:docChg chg="delSld modSld sldOrd">
+      <pc:chgData name="Atef Alvi" userId="fcbff67b5b76dbca" providerId="LiveId" clId="{B4AF8C3F-FCBF-457B-B1B7-7D54D6A861D5}" dt="2019-07-28T21:08:41.532" v="5" actId="2696"/>
+      <pc:docMkLst>
+        <pc:docMk/>
+      </pc:docMkLst>
+      <pc:sldChg chg="del">
+        <pc:chgData name="Atef Alvi" userId="fcbff67b5b76dbca" providerId="LiveId" clId="{B4AF8C3F-FCBF-457B-B1B7-7D54D6A861D5}" dt="2019-07-28T21:08:41.532" v="5" actId="2696"/>
+        <pc:sldMkLst>
+          <pc:docMk/>
+          <pc:sldMk cId="1493758397" sldId="261"/>
+        </pc:sldMkLst>
+      </pc:sldChg>
+      <pc:sldChg chg="modSp ord">
+        <pc:chgData name="Atef Alvi" userId="fcbff67b5b76dbca" providerId="LiveId" clId="{B4AF8C3F-FCBF-457B-B1B7-7D54D6A861D5}" dt="2019-07-28T21:08:38.793" v="4"/>
+        <pc:sldMkLst>
+          <pc:docMk/>
+          <pc:sldMk cId="294559527" sldId="275"/>
+        </pc:sldMkLst>
+        <pc:spChg chg="mod">
+          <ac:chgData name="Atef Alvi" userId="fcbff67b5b76dbca" providerId="LiveId" clId="{B4AF8C3F-FCBF-457B-B1B7-7D54D6A861D5}" dt="2019-07-28T21:08:34.978" v="3" actId="20577"/>
+          <ac:spMkLst>
+            <pc:docMk/>
+            <pc:sldMk cId="294559527" sldId="275"/>
+            <ac:spMk id="2" creationId="{A23CB8D4-7936-4A18-A8E3-73367591F650}"/>
+          </ac:spMkLst>
+        </pc:spChg>
+      </pc:sldChg>
+    </pc:docChg>
+  </pc:docChgLst>
+</pc:chgInfo>
 </file>
 
 <file path=ppt/slideLayouts/slideLayout1.xml><?xml version="1.0" encoding="utf-8"?>
@@ -3634,7 +3678,7 @@
       </p:grpSpPr>
       <p:sp>
         <p:nvSpPr>
-          <p:cNvPr id="20" name="Rectangle 19">
+          <p:cNvPr id="13" name="Rectangle 12">
             <a:extLst>
               <a:ext uri="{FF2B5EF4-FFF2-40B4-BE49-F238E27FC236}">
                 <a16:creationId xmlns:a16="http://schemas.microsoft.com/office/drawing/2014/main" id="{6753252F-4873-4F63-801D-CC719279A7D5}"/>
@@ -3697,6 +3741,265 @@
       </p:sp>
       <p:sp>
         <p:nvSpPr>
+          <p:cNvPr id="15" name="Rectangle 14">
+            <a:extLst>
+              <a:ext uri="{FF2B5EF4-FFF2-40B4-BE49-F238E27FC236}">
+                <a16:creationId xmlns:a16="http://schemas.microsoft.com/office/drawing/2014/main" id="{047C8CCB-F95D-4249-92DD-651249D3535A}"/>
+              </a:ext>
+              <a:ext uri="{C183D7F6-B498-43B3-948B-1728B52AA6E4}">
+                <adec:decorative xmlns:adec="http://schemas.microsoft.com/office/drawing/2017/decorative" val="1"/>
+              </a:ext>
+            </a:extLst>
+          </p:cNvPr>
+          <p:cNvSpPr>
+            <a:spLocks noGrp="1" noRot="1" noChangeAspect="1" noMove="1" noResize="1" noEditPoints="1" noAdjustHandles="1" noChangeArrowheads="1" noChangeShapeType="1" noTextEdit="1"/>
+          </p:cNvSpPr>
+          <p:nvPr>
+            <p:extLst>
+              <p:ext uri="{386F3935-93C4-4BCD-93E2-E3B085C9AB24}">
+                <p16:designElem xmlns:p16="http://schemas.microsoft.com/office/powerpoint/2015/main" val="1"/>
+              </p:ext>
+            </p:extLst>
+          </p:nvPr>
+        </p:nvSpPr>
+        <p:spPr>
+          <a:xfrm>
+            <a:off x="0" y="0"/>
+            <a:ext cx="2013557" cy="6858000"/>
+          </a:xfrm>
+          <a:prstGeom prst="rect">
+            <a:avLst/>
+          </a:prstGeom>
+          <a:solidFill>
+            <a:srgbClr val="2F3250"/>
+          </a:solidFill>
+          <a:ln>
+            <a:noFill/>
+          </a:ln>
+        </p:spPr>
+        <p:style>
+          <a:lnRef idx="2">
+            <a:schemeClr val="accent1">
+              <a:shade val="50000"/>
+            </a:schemeClr>
+          </a:lnRef>
+          <a:fillRef idx="1">
+            <a:schemeClr val="accent1"/>
+          </a:fillRef>
+          <a:effectRef idx="0">
+            <a:schemeClr val="accent1"/>
+          </a:effectRef>
+          <a:fontRef idx="minor">
+            <a:schemeClr val="lt1"/>
+          </a:fontRef>
+        </p:style>
+        <p:txBody>
+          <a:bodyPr rtlCol="0" anchor="ctr"/>
+          <a:lstStyle/>
+          <a:p>
+            <a:pPr algn="ctr"/>
+            <a:endParaRPr lang="en-US"/>
+          </a:p>
+        </p:txBody>
+      </p:sp>
+      <p:sp>
+        <p:nvSpPr>
+          <p:cNvPr id="2" name="Title 1">
+            <a:extLst>
+              <a:ext uri="{FF2B5EF4-FFF2-40B4-BE49-F238E27FC236}">
+                <a16:creationId xmlns:a16="http://schemas.microsoft.com/office/drawing/2014/main" id="{A23CB8D4-7936-4A18-A8E3-73367591F650}"/>
+              </a:ext>
+            </a:extLst>
+          </p:cNvPr>
+          <p:cNvSpPr>
+            <a:spLocks noGrp="1"/>
+          </p:cNvSpPr>
+          <p:nvPr>
+            <p:ph type="title"/>
+          </p:nvPr>
+        </p:nvSpPr>
+        <p:spPr>
+          <a:xfrm>
+            <a:off x="885190" y="2318294"/>
+            <a:ext cx="2256734" cy="2221412"/>
+          </a:xfrm>
+          <a:prstGeom prst="ellipse">
+            <a:avLst/>
+          </a:prstGeom>
+          <a:solidFill>
+            <a:srgbClr val="262626"/>
+          </a:solidFill>
+          <a:ln w="174625" cmpd="thinThick">
+            <a:solidFill>
+              <a:srgbClr val="262626"/>
+            </a:solidFill>
+          </a:ln>
+        </p:spPr>
+        <p:txBody>
+          <a:bodyPr vert="horz" lIns="91440" tIns="45720" rIns="91440" bIns="45720" rtlCol="0" anchor="ctr">
+            <a:normAutofit/>
+          </a:bodyPr>
+          <a:lstStyle/>
+          <a:p>
+            <a:pPr algn="ctr"/>
+            <a:r>
+              <a:rPr lang="en-US" sz="2600" kern="1200" dirty="0" err="1">
+                <a:solidFill>
+                  <a:srgbClr val="FFFFFF"/>
+                </a:solidFill>
+                <a:latin typeface="+mj-lt"/>
+                <a:ea typeface="+mj-ea"/>
+                <a:cs typeface="+mj-cs"/>
+              </a:rPr>
+              <a:t>Apriori</a:t>
+            </a:r>
+            <a:r>
+              <a:rPr lang="en-US" sz="2600" kern="1200" dirty="0">
+                <a:solidFill>
+                  <a:srgbClr val="FFFFFF"/>
+                </a:solidFill>
+                <a:latin typeface="+mj-lt"/>
+                <a:ea typeface="+mj-ea"/>
+                <a:cs typeface="+mj-cs"/>
+              </a:rPr>
+              <a:t> High Income Rules</a:t>
+            </a:r>
+          </a:p>
+        </p:txBody>
+      </p:sp>
+      <p:pic>
+        <p:nvPicPr>
+          <p:cNvPr id="3" name="Picture 2">
+            <a:extLst>
+              <a:ext uri="{FF2B5EF4-FFF2-40B4-BE49-F238E27FC236}">
+                <a16:creationId xmlns:a16="http://schemas.microsoft.com/office/drawing/2014/main" id="{59E8625C-4D44-4993-9431-18270CB88E4E}"/>
+              </a:ext>
+            </a:extLst>
+          </p:cNvPr>
+          <p:cNvPicPr>
+            <a:picLocks noChangeAspect="1"/>
+          </p:cNvPicPr>
+          <p:nvPr/>
+        </p:nvPicPr>
+        <p:blipFill>
+          <a:blip r:embed="rId2"/>
+          <a:stretch>
+            <a:fillRect/>
+          </a:stretch>
+        </p:blipFill>
+        <p:spPr>
+          <a:xfrm>
+            <a:off x="3943350" y="1640935"/>
+            <a:ext cx="7188199" cy="3576129"/>
+          </a:xfrm>
+          <a:prstGeom prst="rect">
+            <a:avLst/>
+          </a:prstGeom>
+        </p:spPr>
+      </p:pic>
+    </p:spTree>
+    <p:extLst>
+      <p:ext uri="{BB962C8B-B14F-4D97-AF65-F5344CB8AC3E}">
+        <p14:creationId xmlns:p14="http://schemas.microsoft.com/office/powerpoint/2010/main" val="1438835665"/>
+      </p:ext>
+    </p:extLst>
+  </p:cSld>
+  <p:clrMapOvr>
+    <a:masterClrMapping/>
+  </p:clrMapOvr>
+</p:sld>
+</file>
+
+<file path=ppt/slides/slide11.xml><?xml version="1.0" encoding="utf-8"?>
+<p:sld xmlns:a="http://schemas.openxmlformats.org/drawingml/2006/main" xmlns:r="http://schemas.openxmlformats.org/officeDocument/2006/relationships" xmlns:p="http://schemas.openxmlformats.org/presentationml/2006/main">
+  <p:cSld>
+    <p:bg>
+      <p:bgPr>
+        <a:solidFill>
+          <a:schemeClr val="bg1"/>
+        </a:solidFill>
+        <a:effectLst/>
+      </p:bgPr>
+    </p:bg>
+    <p:spTree>
+      <p:nvGrpSpPr>
+        <p:cNvPr id="1" name=""/>
+        <p:cNvGrpSpPr/>
+        <p:nvPr/>
+      </p:nvGrpSpPr>
+      <p:grpSpPr>
+        <a:xfrm>
+          <a:off x="0" y="0"/>
+          <a:ext cx="0" cy="0"/>
+          <a:chOff x="0" y="0"/>
+          <a:chExt cx="0" cy="0"/>
+        </a:xfrm>
+      </p:grpSpPr>
+      <p:sp>
+        <p:nvSpPr>
+          <p:cNvPr id="20" name="Rectangle 19">
+            <a:extLst>
+              <a:ext uri="{FF2B5EF4-FFF2-40B4-BE49-F238E27FC236}">
+                <a16:creationId xmlns:a16="http://schemas.microsoft.com/office/drawing/2014/main" id="{6753252F-4873-4F63-801D-CC719279A7D5}"/>
+              </a:ext>
+              <a:ext uri="{C183D7F6-B498-43B3-948B-1728B52AA6E4}">
+                <adec:decorative xmlns:adec="http://schemas.microsoft.com/office/drawing/2017/decorative" val="1"/>
+              </a:ext>
+            </a:extLst>
+          </p:cNvPr>
+          <p:cNvSpPr>
+            <a:spLocks noGrp="1" noRot="1" noChangeAspect="1" noMove="1" noResize="1" noEditPoints="1" noAdjustHandles="1" noChangeArrowheads="1" noChangeShapeType="1" noTextEdit="1"/>
+          </p:cNvSpPr>
+          <p:nvPr>
+            <p:extLst>
+              <p:ext uri="{386F3935-93C4-4BCD-93E2-E3B085C9AB24}">
+                <p16:designElem xmlns:p16="http://schemas.microsoft.com/office/powerpoint/2015/main" val="1"/>
+              </p:ext>
+            </p:extLst>
+          </p:nvPr>
+        </p:nvSpPr>
+        <p:spPr>
+          <a:xfrm>
+            <a:off x="0" y="0"/>
+            <a:ext cx="12192000" cy="6858000"/>
+          </a:xfrm>
+          <a:prstGeom prst="rect">
+            <a:avLst/>
+          </a:prstGeom>
+          <a:solidFill>
+            <a:srgbClr val="FFFFFF"/>
+          </a:solidFill>
+          <a:ln>
+            <a:noFill/>
+          </a:ln>
+        </p:spPr>
+        <p:style>
+          <a:lnRef idx="2">
+            <a:schemeClr val="accent1">
+              <a:shade val="50000"/>
+            </a:schemeClr>
+          </a:lnRef>
+          <a:fillRef idx="1">
+            <a:schemeClr val="accent1"/>
+          </a:fillRef>
+          <a:effectRef idx="0">
+            <a:schemeClr val="accent1"/>
+          </a:effectRef>
+          <a:fontRef idx="minor">
+            <a:schemeClr val="lt1"/>
+          </a:fontRef>
+        </p:style>
+        <p:txBody>
+          <a:bodyPr rtlCol="0" anchor="ctr"/>
+          <a:lstStyle/>
+          <a:p>
+            <a:pPr algn="ctr"/>
+            <a:endParaRPr lang="en-US"/>
+          </a:p>
+        </p:txBody>
+      </p:sp>
+      <p:sp>
+        <p:nvSpPr>
           <p:cNvPr id="22" name="Rectangle 21">
             <a:extLst>
               <a:ext uri="{FF2B5EF4-FFF2-40B4-BE49-F238E27FC236}">
@@ -3845,253 +4148,6 @@
     <p:extLst>
       <p:ext uri="{BB962C8B-B14F-4D97-AF65-F5344CB8AC3E}">
         <p14:creationId xmlns:p14="http://schemas.microsoft.com/office/powerpoint/2010/main" val="1184179694"/>
-      </p:ext>
-    </p:extLst>
-  </p:cSld>
-  <p:clrMapOvr>
-    <a:masterClrMapping/>
-  </p:clrMapOvr>
-</p:sld>
-</file>
-
-<file path=ppt/slides/slide11.xml><?xml version="1.0" encoding="utf-8"?>
-<p:sld xmlns:a="http://schemas.openxmlformats.org/drawingml/2006/main" xmlns:r="http://schemas.openxmlformats.org/officeDocument/2006/relationships" xmlns:p="http://schemas.openxmlformats.org/presentationml/2006/main">
-  <p:cSld>
-    <p:bg>
-      <p:bgPr>
-        <a:solidFill>
-          <a:schemeClr val="bg1"/>
-        </a:solidFill>
-        <a:effectLst/>
-      </p:bgPr>
-    </p:bg>
-    <p:spTree>
-      <p:nvGrpSpPr>
-        <p:cNvPr id="1" name=""/>
-        <p:cNvGrpSpPr/>
-        <p:nvPr/>
-      </p:nvGrpSpPr>
-      <p:grpSpPr>
-        <a:xfrm>
-          <a:off x="0" y="0"/>
-          <a:ext cx="0" cy="0"/>
-          <a:chOff x="0" y="0"/>
-          <a:chExt cx="0" cy="0"/>
-        </a:xfrm>
-      </p:grpSpPr>
-      <p:sp>
-        <p:nvSpPr>
-          <p:cNvPr id="20" name="Rectangle 19">
-            <a:extLst>
-              <a:ext uri="{FF2B5EF4-FFF2-40B4-BE49-F238E27FC236}">
-                <a16:creationId xmlns:a16="http://schemas.microsoft.com/office/drawing/2014/main" id="{6753252F-4873-4F63-801D-CC719279A7D5}"/>
-              </a:ext>
-              <a:ext uri="{C183D7F6-B498-43B3-948B-1728B52AA6E4}">
-                <adec:decorative xmlns:adec="http://schemas.microsoft.com/office/drawing/2017/decorative" val="1"/>
-              </a:ext>
-            </a:extLst>
-          </p:cNvPr>
-          <p:cNvSpPr>
-            <a:spLocks noGrp="1" noRot="1" noChangeAspect="1" noMove="1" noResize="1" noEditPoints="1" noAdjustHandles="1" noChangeArrowheads="1" noChangeShapeType="1" noTextEdit="1"/>
-          </p:cNvSpPr>
-          <p:nvPr>
-            <p:extLst>
-              <p:ext uri="{386F3935-93C4-4BCD-93E2-E3B085C9AB24}">
-                <p16:designElem xmlns:p16="http://schemas.microsoft.com/office/powerpoint/2015/main" val="1"/>
-              </p:ext>
-            </p:extLst>
-          </p:nvPr>
-        </p:nvSpPr>
-        <p:spPr>
-          <a:xfrm>
-            <a:off x="0" y="0"/>
-            <a:ext cx="12192000" cy="6858000"/>
-          </a:xfrm>
-          <a:prstGeom prst="rect">
-            <a:avLst/>
-          </a:prstGeom>
-          <a:solidFill>
-            <a:srgbClr val="FFFFFF"/>
-          </a:solidFill>
-          <a:ln>
-            <a:noFill/>
-          </a:ln>
-        </p:spPr>
-        <p:style>
-          <a:lnRef idx="2">
-            <a:schemeClr val="accent1">
-              <a:shade val="50000"/>
-            </a:schemeClr>
-          </a:lnRef>
-          <a:fillRef idx="1">
-            <a:schemeClr val="accent1"/>
-          </a:fillRef>
-          <a:effectRef idx="0">
-            <a:schemeClr val="accent1"/>
-          </a:effectRef>
-          <a:fontRef idx="minor">
-            <a:schemeClr val="lt1"/>
-          </a:fontRef>
-        </p:style>
-        <p:txBody>
-          <a:bodyPr rtlCol="0" anchor="ctr"/>
-          <a:lstStyle/>
-          <a:p>
-            <a:pPr algn="ctr"/>
-            <a:endParaRPr lang="en-US"/>
-          </a:p>
-        </p:txBody>
-      </p:sp>
-      <p:sp>
-        <p:nvSpPr>
-          <p:cNvPr id="22" name="Rectangle 21">
-            <a:extLst>
-              <a:ext uri="{FF2B5EF4-FFF2-40B4-BE49-F238E27FC236}">
-                <a16:creationId xmlns:a16="http://schemas.microsoft.com/office/drawing/2014/main" id="{047C8CCB-F95D-4249-92DD-651249D3535A}"/>
-              </a:ext>
-              <a:ext uri="{C183D7F6-B498-43B3-948B-1728B52AA6E4}">
-                <adec:decorative xmlns:adec="http://schemas.microsoft.com/office/drawing/2017/decorative" val="1"/>
-              </a:ext>
-            </a:extLst>
-          </p:cNvPr>
-          <p:cNvSpPr>
-            <a:spLocks noGrp="1" noRot="1" noChangeAspect="1" noMove="1" noResize="1" noEditPoints="1" noAdjustHandles="1" noChangeArrowheads="1" noChangeShapeType="1" noTextEdit="1"/>
-          </p:cNvSpPr>
-          <p:nvPr>
-            <p:extLst>
-              <p:ext uri="{386F3935-93C4-4BCD-93E2-E3B085C9AB24}">
-                <p16:designElem xmlns:p16="http://schemas.microsoft.com/office/powerpoint/2015/main" val="1"/>
-              </p:ext>
-            </p:extLst>
-          </p:nvPr>
-        </p:nvSpPr>
-        <p:spPr>
-          <a:xfrm>
-            <a:off x="0" y="0"/>
-            <a:ext cx="2013557" cy="6858000"/>
-          </a:xfrm>
-          <a:prstGeom prst="rect">
-            <a:avLst/>
-          </a:prstGeom>
-          <a:solidFill>
-            <a:srgbClr val="6D5852"/>
-          </a:solidFill>
-          <a:ln>
-            <a:noFill/>
-          </a:ln>
-        </p:spPr>
-        <p:style>
-          <a:lnRef idx="2">
-            <a:schemeClr val="accent1">
-              <a:shade val="50000"/>
-            </a:schemeClr>
-          </a:lnRef>
-          <a:fillRef idx="1">
-            <a:schemeClr val="accent1"/>
-          </a:fillRef>
-          <a:effectRef idx="0">
-            <a:schemeClr val="accent1"/>
-          </a:effectRef>
-          <a:fontRef idx="minor">
-            <a:schemeClr val="lt1"/>
-          </a:fontRef>
-        </p:style>
-        <p:txBody>
-          <a:bodyPr rtlCol="0" anchor="ctr"/>
-          <a:lstStyle/>
-          <a:p>
-            <a:pPr algn="ctr"/>
-            <a:endParaRPr lang="en-US"/>
-          </a:p>
-        </p:txBody>
-      </p:sp>
-      <p:sp>
-        <p:nvSpPr>
-          <p:cNvPr id="2" name="Title 1">
-            <a:extLst>
-              <a:ext uri="{FF2B5EF4-FFF2-40B4-BE49-F238E27FC236}">
-                <a16:creationId xmlns:a16="http://schemas.microsoft.com/office/drawing/2014/main" id="{A23CB8D4-7936-4A18-A8E3-73367591F650}"/>
-              </a:ext>
-            </a:extLst>
-          </p:cNvPr>
-          <p:cNvSpPr>
-            <a:spLocks noGrp="1"/>
-          </p:cNvSpPr>
-          <p:nvPr>
-            <p:ph type="title"/>
-          </p:nvPr>
-        </p:nvSpPr>
-        <p:spPr>
-          <a:xfrm>
-            <a:off x="796897" y="2231383"/>
-            <a:ext cx="2433319" cy="2395233"/>
-          </a:xfrm>
-          <a:prstGeom prst="ellipse">
-            <a:avLst/>
-          </a:prstGeom>
-          <a:solidFill>
-            <a:srgbClr val="262626"/>
-          </a:solidFill>
-          <a:ln w="174625" cmpd="thinThick">
-            <a:solidFill>
-              <a:srgbClr val="262626"/>
-            </a:solidFill>
-          </a:ln>
-        </p:spPr>
-        <p:txBody>
-          <a:bodyPr vert="horz" lIns="91440" tIns="45720" rIns="91440" bIns="45720" rtlCol="0" anchor="ctr">
-            <a:normAutofit/>
-          </a:bodyPr>
-          <a:lstStyle/>
-          <a:p>
-            <a:pPr algn="ctr"/>
-            <a:r>
-              <a:rPr lang="en-US" sz="2600" kern="1200">
-                <a:solidFill>
-                  <a:srgbClr val="FFFFFF"/>
-                </a:solidFill>
-                <a:latin typeface="+mj-lt"/>
-                <a:ea typeface="+mj-ea"/>
-                <a:cs typeface="+mj-cs"/>
-              </a:rPr>
-              <a:t>Apriori High Income Rules</a:t>
-            </a:r>
-          </a:p>
-        </p:txBody>
-      </p:sp>
-      <p:pic>
-        <p:nvPicPr>
-          <p:cNvPr id="4" name="Picture 3">
-            <a:extLst>
-              <a:ext uri="{FF2B5EF4-FFF2-40B4-BE49-F238E27FC236}">
-                <a16:creationId xmlns:a16="http://schemas.microsoft.com/office/drawing/2014/main" id="{DDF64598-5310-4627-909B-366562B6B2B5}"/>
-              </a:ext>
-            </a:extLst>
-          </p:cNvPr>
-          <p:cNvPicPr>
-            <a:picLocks noChangeAspect="1"/>
-          </p:cNvPicPr>
-          <p:nvPr/>
-        </p:nvPicPr>
-        <p:blipFill rotWithShape="1">
-          <a:blip r:embed="rId2"/>
-          <a:srcRect l="8257"/>
-          <a:stretch/>
-        </p:blipFill>
-        <p:spPr>
-          <a:xfrm>
-            <a:off x="4027113" y="1370170"/>
-            <a:ext cx="7593262" cy="4117659"/>
-          </a:xfrm>
-          <a:prstGeom prst="rect">
-            <a:avLst/>
-          </a:prstGeom>
-        </p:spPr>
-      </p:pic>
-    </p:spTree>
-    <p:extLst>
-      <p:ext uri="{BB962C8B-B14F-4D97-AF65-F5344CB8AC3E}">
-        <p14:creationId xmlns:p14="http://schemas.microsoft.com/office/powerpoint/2010/main" val="403841899"/>
       </p:ext>
     </p:extLst>
   </p:cSld>
@@ -4654,7 +4710,7 @@
         </p:blipFill>
         <p:spPr>
           <a:xfrm>
-            <a:off x="-466351" y="286378"/>
+            <a:off x="-507491" y="286377"/>
             <a:ext cx="13206982" cy="6571623"/>
           </a:xfrm>
           <a:prstGeom prst="rect">
@@ -5893,6 +5949,69 @@
       </p:grpSpPr>
       <p:sp>
         <p:nvSpPr>
+          <p:cNvPr id="10" name="Rectangle 9">
+            <a:extLst>
+              <a:ext uri="{FF2B5EF4-FFF2-40B4-BE49-F238E27FC236}">
+                <a16:creationId xmlns:a16="http://schemas.microsoft.com/office/drawing/2014/main" id="{A4AC5506-6312-4701-8D3C-40187889A947}"/>
+              </a:ext>
+              <a:ext uri="{C183D7F6-B498-43B3-948B-1728B52AA6E4}">
+                <adec:decorative xmlns:adec="http://schemas.microsoft.com/office/drawing/2017/decorative" val="1"/>
+              </a:ext>
+            </a:extLst>
+          </p:cNvPr>
+          <p:cNvSpPr>
+            <a:spLocks noGrp="1" noRot="1" noChangeAspect="1" noMove="1" noResize="1" noEditPoints="1" noAdjustHandles="1" noChangeArrowheads="1" noChangeShapeType="1" noTextEdit="1"/>
+          </p:cNvSpPr>
+          <p:nvPr>
+            <p:extLst>
+              <p:ext uri="{386F3935-93C4-4BCD-93E2-E3B085C9AB24}">
+                <p16:designElem xmlns:p16="http://schemas.microsoft.com/office/powerpoint/2015/main" val="1"/>
+              </p:ext>
+            </p:extLst>
+          </p:nvPr>
+        </p:nvSpPr>
+        <p:spPr>
+          <a:xfrm>
+            <a:off x="0" y="651752"/>
+            <a:ext cx="12192000" cy="736551"/>
+          </a:xfrm>
+          <a:prstGeom prst="rect">
+            <a:avLst/>
+          </a:prstGeom>
+          <a:solidFill>
+            <a:schemeClr val="tx1"/>
+          </a:solidFill>
+          <a:ln>
+            <a:noFill/>
+          </a:ln>
+        </p:spPr>
+        <p:style>
+          <a:lnRef idx="2">
+            <a:schemeClr val="accent1">
+              <a:shade val="50000"/>
+            </a:schemeClr>
+          </a:lnRef>
+          <a:fillRef idx="1">
+            <a:schemeClr val="accent1"/>
+          </a:fillRef>
+          <a:effectRef idx="0">
+            <a:schemeClr val="accent1"/>
+          </a:effectRef>
+          <a:fontRef idx="minor">
+            <a:schemeClr val="lt1"/>
+          </a:fontRef>
+        </p:style>
+        <p:txBody>
+          <a:bodyPr rtlCol="0" anchor="ctr"/>
+          <a:lstStyle/>
+          <a:p>
+            <a:pPr algn="ctr"/>
+            <a:endParaRPr lang="en-US"/>
+          </a:p>
+        </p:txBody>
+      </p:sp>
+      <p:sp>
+        <p:nvSpPr>
           <p:cNvPr id="2" name="Title 1">
             <a:extLst>
               <a:ext uri="{FF2B5EF4-FFF2-40B4-BE49-F238E27FC236}">
@@ -5907,167 +6026,1090 @@
             <p:ph type="title"/>
           </p:nvPr>
         </p:nvSpPr>
-        <p:spPr/>
+        <p:spPr>
+          <a:xfrm>
+            <a:off x="556532" y="643467"/>
+            <a:ext cx="11210925" cy="744836"/>
+          </a:xfrm>
+        </p:spPr>
         <p:txBody>
-          <a:bodyPr/>
+          <a:bodyPr vert="horz" lIns="91440" tIns="45720" rIns="91440" bIns="45720" rtlCol="0" anchor="ctr">
+            <a:normAutofit/>
+          </a:bodyPr>
           <a:lstStyle/>
           <a:p>
+            <a:pPr algn="ctr"/>
             <a:r>
-              <a:rPr lang="en-CA" dirty="0" err="1"/>
-              <a:t>Apriori</a:t>
-            </a:r>
-            <a:r>
-              <a:rPr lang="en-CA" dirty="0"/>
-              <a:t> High Income Rules</a:t>
+              <a:rPr lang="en-US" sz="3200" kern="1200">
+                <a:solidFill>
+                  <a:schemeClr val="bg1"/>
+                </a:solidFill>
+                <a:latin typeface="+mj-lt"/>
+                <a:ea typeface="+mj-ea"/>
+                <a:cs typeface="+mj-cs"/>
+              </a:rPr>
+              <a:t>Apriori Low Income Rules</a:t>
             </a:r>
           </a:p>
         </p:txBody>
       </p:sp>
-      <p:sp>
-        <p:nvSpPr>
-          <p:cNvPr id="4" name="Rectangle 3">
-            <a:extLst>
-              <a:ext uri="{FF2B5EF4-FFF2-40B4-BE49-F238E27FC236}">
-                <a16:creationId xmlns:a16="http://schemas.microsoft.com/office/drawing/2014/main" id="{F32871ED-B712-4C34-AE66-A22A508D456F}"/>
-              </a:ext>
-            </a:extLst>
-          </p:cNvPr>
-          <p:cNvSpPr/>
-          <p:nvPr/>
-        </p:nvSpPr>
-        <p:spPr>
-          <a:xfrm>
-            <a:off x="381000" y="1997839"/>
-            <a:ext cx="11449049" cy="3139321"/>
-          </a:xfrm>
-          <a:prstGeom prst="rect">
-            <a:avLst/>
-          </a:prstGeom>
-        </p:spPr>
-        <p:txBody>
-          <a:bodyPr wrap="square">
-            <a:spAutoFit/>
-          </a:bodyPr>
-          <a:lstStyle/>
-          <a:p>
-            <a:r>
-              <a:rPr lang="en-CA" dirty="0"/>
-              <a:t>[1] {</a:t>
-            </a:r>
-            <a:r>
-              <a:rPr lang="en-CA" dirty="0" err="1"/>
-              <a:t>Immigrant.admission.category</a:t>
-            </a:r>
-            <a:r>
-              <a:rPr lang="en-CA" dirty="0"/>
-              <a:t>=Canadian experience class, principal applicants}                                    =&gt; {</a:t>
-            </a:r>
-            <a:r>
-              <a:rPr lang="en-CA" dirty="0" err="1"/>
-              <a:t>CatValue</a:t>
-            </a:r>
-            <a:r>
-              <a:rPr lang="en-CA" dirty="0"/>
-              <a:t>=(4e+04,4.7e+05]} 0.02613312 0.7356322  7.41384 128  </a:t>
-            </a:r>
-          </a:p>
-          <a:p>
-            <a:endParaRPr lang="en-CA" dirty="0"/>
-          </a:p>
-          <a:p>
-            <a:r>
-              <a:rPr lang="en-CA" dirty="0"/>
-              <a:t>[2] {</a:t>
-            </a:r>
-            <a:r>
-              <a:rPr lang="en-CA" dirty="0" err="1"/>
-              <a:t>Immigrant.admission.category</a:t>
-            </a:r>
-            <a:r>
-              <a:rPr lang="en-CA" dirty="0"/>
-              <a:t>=Skilled workers, principal applicants}  =&gt; {</a:t>
-            </a:r>
-            <a:r>
-              <a:rPr lang="en-CA" dirty="0" err="1"/>
-              <a:t>CatValue</a:t>
-            </a:r>
-            <a:r>
-              <a:rPr lang="en-CA" dirty="0"/>
-              <a:t>=(4e+04,4.7e+05]} 0.02062066 0.5401070  5.44330 101  </a:t>
-            </a:r>
-          </a:p>
-          <a:p>
-            <a:endParaRPr lang="en-CA" dirty="0"/>
-          </a:p>
-          <a:p>
-            <a:r>
-              <a:rPr lang="en-CA" dirty="0"/>
-              <a:t>[3] {</a:t>
-            </a:r>
-            <a:r>
-              <a:rPr lang="en-CA" dirty="0" err="1"/>
-              <a:t>Family.status</a:t>
-            </a:r>
-            <a:r>
-              <a:rPr lang="en-CA" dirty="0"/>
-              <a:t>=Principal </a:t>
-            </a:r>
-            <a:r>
-              <a:rPr lang="en-CA" dirty="0" err="1"/>
-              <a:t>applicants,Immigrant.admission.category</a:t>
-            </a:r>
-            <a:r>
-              <a:rPr lang="en-CA" dirty="0"/>
-              <a:t>=Canadian experience class, principal applicants} =&gt; {</a:t>
-            </a:r>
-            <a:r>
-              <a:rPr lang="en-CA" dirty="0" err="1"/>
-              <a:t>CatValue</a:t>
-            </a:r>
-            <a:r>
-              <a:rPr lang="en-CA" dirty="0"/>
-              <a:t>=(4e+04,4.7e+05]} 0.02613312 0.7356322  7.41384 128  </a:t>
-            </a:r>
-          </a:p>
-          <a:p>
-            <a:endParaRPr lang="en-CA" dirty="0"/>
-          </a:p>
-          <a:p>
-            <a:r>
-              <a:rPr lang="en-CA" dirty="0"/>
-              <a:t>[4] {</a:t>
-            </a:r>
-            <a:r>
-              <a:rPr lang="en-CA" dirty="0" err="1"/>
-              <a:t>Family.status</a:t>
-            </a:r>
-            <a:r>
-              <a:rPr lang="en-CA" dirty="0"/>
-              <a:t>=Principal </a:t>
-            </a:r>
-            <a:r>
-              <a:rPr lang="en-CA" dirty="0" err="1"/>
-              <a:t>applicants,Immigrant.admission.category</a:t>
-            </a:r>
-            <a:r>
-              <a:rPr lang="en-CA" dirty="0"/>
-              <a:t>=Skilled workers, principal applicants}           =&gt; {</a:t>
-            </a:r>
-            <a:r>
-              <a:rPr lang="en-CA" dirty="0" err="1"/>
-              <a:t>CatValue</a:t>
-            </a:r>
-            <a:r>
-              <a:rPr lang="en-CA" dirty="0"/>
-              <a:t>=(4e+04,4.7e+05]} 0.02062066 0.5401070  5.44330 101 </a:t>
-            </a:r>
-          </a:p>
-        </p:txBody>
-      </p:sp>
+      <p:graphicFrame>
+        <p:nvGraphicFramePr>
+          <p:cNvPr id="5" name="Table 4">
+            <a:extLst>
+              <a:ext uri="{FF2B5EF4-FFF2-40B4-BE49-F238E27FC236}">
+                <a16:creationId xmlns:a16="http://schemas.microsoft.com/office/drawing/2014/main" id="{F01F8089-FE7F-4F3B-9D29-DE2DEBEAA6C3}"/>
+              </a:ext>
+            </a:extLst>
+          </p:cNvPr>
+          <p:cNvGraphicFramePr>
+            <a:graphicFrameLocks noGrp="1"/>
+          </p:cNvGraphicFramePr>
+          <p:nvPr>
+            <p:extLst>
+              <p:ext uri="{D42A27DB-BD31-4B8C-83A1-F6EECF244321}">
+                <p14:modId xmlns:p14="http://schemas.microsoft.com/office/powerpoint/2010/main" val="3661809360"/>
+              </p:ext>
+            </p:extLst>
+          </p:nvPr>
+        </p:nvGraphicFramePr>
+        <p:xfrm>
+          <a:off x="643467" y="2246120"/>
+          <a:ext cx="10905070" cy="3252414"/>
+        </p:xfrm>
+        <a:graphic>
+          <a:graphicData uri="http://schemas.openxmlformats.org/drawingml/2006/table">
+            <a:tbl>
+              <a:tblPr firstRow="1" firstCol="1" bandRow="1">
+                <a:noFill/>
+                <a:tableStyleId>{5C22544A-7EE6-4342-B048-85BDC9FD1C3A}</a:tableStyleId>
+              </a:tblPr>
+              <a:tblGrid>
+                <a:gridCol w="1223234">
+                  <a:extLst>
+                    <a:ext uri="{9D8B030D-6E8A-4147-A177-3AD203B41FA5}">
+                      <a16:colId xmlns:a16="http://schemas.microsoft.com/office/drawing/2014/main" val="2614266101"/>
+                    </a:ext>
+                  </a:extLst>
+                </a:gridCol>
+                <a:gridCol w="2865825">
+                  <a:extLst>
+                    <a:ext uri="{9D8B030D-6E8A-4147-A177-3AD203B41FA5}">
+                      <a16:colId xmlns:a16="http://schemas.microsoft.com/office/drawing/2014/main" val="3617011815"/>
+                    </a:ext>
+                  </a:extLst>
+                </a:gridCol>
+                <a:gridCol w="1820540">
+                  <a:extLst>
+                    <a:ext uri="{9D8B030D-6E8A-4147-A177-3AD203B41FA5}">
+                      <a16:colId xmlns:a16="http://schemas.microsoft.com/office/drawing/2014/main" val="270380389"/>
+                    </a:ext>
+                  </a:extLst>
+                </a:gridCol>
+                <a:gridCol w="1962068">
+                  <a:extLst>
+                    <a:ext uri="{9D8B030D-6E8A-4147-A177-3AD203B41FA5}">
+                      <a16:colId xmlns:a16="http://schemas.microsoft.com/office/drawing/2014/main" val="1316107225"/>
+                    </a:ext>
+                  </a:extLst>
+                </a:gridCol>
+                <a:gridCol w="1579958">
+                  <a:extLst>
+                    <a:ext uri="{9D8B030D-6E8A-4147-A177-3AD203B41FA5}">
+                      <a16:colId xmlns:a16="http://schemas.microsoft.com/office/drawing/2014/main" val="3429808337"/>
+                    </a:ext>
+                  </a:extLst>
+                </a:gridCol>
+                <a:gridCol w="1453445">
+                  <a:extLst>
+                    <a:ext uri="{9D8B030D-6E8A-4147-A177-3AD203B41FA5}">
+                      <a16:colId xmlns:a16="http://schemas.microsoft.com/office/drawing/2014/main" val="4240416313"/>
+                    </a:ext>
+                  </a:extLst>
+                </a:gridCol>
+              </a:tblGrid>
+              <a:tr h="1496583">
+                <a:tc>
+                  <a:txBody>
+                    <a:bodyPr/>
+                    <a:lstStyle/>
+                    <a:p>
+                      <a:pPr>
+                        <a:lnSpc>
+                          <a:spcPct val="115000"/>
+                        </a:lnSpc>
+                        <a:spcAft>
+                          <a:spcPts val="0"/>
+                        </a:spcAft>
+                      </a:pPr>
+                      <a:r>
+                        <a:rPr lang="en-US" sz="2400" b="1" dirty="0">
+                          <a:solidFill>
+                            <a:schemeClr val="tx1">
+                              <a:lumMod val="75000"/>
+                              <a:lumOff val="25000"/>
+                            </a:schemeClr>
+                          </a:solidFill>
+                          <a:effectLst/>
+                        </a:rPr>
+                        <a:t>Rule</a:t>
+                      </a:r>
+                      <a:endParaRPr lang="en-CA" sz="2400" b="1" dirty="0">
+                        <a:solidFill>
+                          <a:schemeClr val="tx1">
+                            <a:lumMod val="75000"/>
+                            <a:lumOff val="25000"/>
+                          </a:schemeClr>
+                        </a:solidFill>
+                        <a:effectLst/>
+                        <a:latin typeface="Calibri" panose="020F0502020204030204" pitchFamily="34" charset="0"/>
+                        <a:ea typeface="Calibri" panose="020F0502020204030204" pitchFamily="34" charset="0"/>
+                        <a:cs typeface="Arial" panose="020B0604020202020204" pitchFamily="34" charset="0"/>
+                      </a:endParaRPr>
+                    </a:p>
+                  </a:txBody>
+                  <a:tcPr marL="238922" marR="179192" marT="119461" marB="119461">
+                    <a:lnL w="12700" cmpd="sng">
+                      <a:noFill/>
+                      <a:prstDash val="solid"/>
+                    </a:lnL>
+                    <a:lnR w="12700" cmpd="sng">
+                      <a:noFill/>
+                      <a:prstDash val="solid"/>
+                    </a:lnR>
+                    <a:lnT w="9525" cap="flat" cmpd="sng" algn="ctr">
+                      <a:noFill/>
+                      <a:prstDash val="solid"/>
+                    </a:lnT>
+                    <a:lnB w="9525" cap="flat" cmpd="sng" algn="ctr">
+                      <a:solidFill>
+                        <a:srgbClr val="C7C6C1"/>
+                      </a:solidFill>
+                      <a:prstDash val="solid"/>
+                    </a:lnB>
+                    <a:noFill/>
+                  </a:tcPr>
+                </a:tc>
+                <a:tc>
+                  <a:txBody>
+                    <a:bodyPr/>
+                    <a:lstStyle/>
+                    <a:p>
+                      <a:pPr>
+                        <a:lnSpc>
+                          <a:spcPct val="115000"/>
+                        </a:lnSpc>
+                        <a:spcAft>
+                          <a:spcPts val="0"/>
+                        </a:spcAft>
+                      </a:pPr>
+                      <a:r>
+                        <a:rPr lang="en-US" sz="2400" b="1" dirty="0">
+                          <a:solidFill>
+                            <a:schemeClr val="tx1">
+                              <a:lumMod val="75000"/>
+                              <a:lumOff val="25000"/>
+                            </a:schemeClr>
+                          </a:solidFill>
+                          <a:effectLst/>
+                        </a:rPr>
+                        <a:t>LHS</a:t>
+                      </a:r>
+                      <a:endParaRPr lang="en-CA" sz="2400" b="1" dirty="0">
+                        <a:solidFill>
+                          <a:schemeClr val="tx1">
+                            <a:lumMod val="75000"/>
+                            <a:lumOff val="25000"/>
+                          </a:schemeClr>
+                        </a:solidFill>
+                        <a:effectLst/>
+                        <a:latin typeface="Calibri" panose="020F0502020204030204" pitchFamily="34" charset="0"/>
+                        <a:ea typeface="Calibri" panose="020F0502020204030204" pitchFamily="34" charset="0"/>
+                        <a:cs typeface="Arial" panose="020B0604020202020204" pitchFamily="34" charset="0"/>
+                      </a:endParaRPr>
+                    </a:p>
+                  </a:txBody>
+                  <a:tcPr marL="238922" marR="179192" marT="119461" marB="119461">
+                    <a:lnL w="12700" cmpd="sng">
+                      <a:noFill/>
+                      <a:prstDash val="solid"/>
+                    </a:lnL>
+                    <a:lnR w="12700" cmpd="sng">
+                      <a:noFill/>
+                      <a:prstDash val="solid"/>
+                    </a:lnR>
+                    <a:lnT w="9525" cap="flat" cmpd="sng" algn="ctr">
+                      <a:noFill/>
+                      <a:prstDash val="solid"/>
+                    </a:lnT>
+                    <a:lnB w="9525" cap="flat" cmpd="sng" algn="ctr">
+                      <a:solidFill>
+                        <a:srgbClr val="C7C6C1"/>
+                      </a:solidFill>
+                      <a:prstDash val="solid"/>
+                    </a:lnB>
+                    <a:noFill/>
+                  </a:tcPr>
+                </a:tc>
+                <a:tc>
+                  <a:txBody>
+                    <a:bodyPr/>
+                    <a:lstStyle/>
+                    <a:p>
+                      <a:pPr>
+                        <a:spcAft>
+                          <a:spcPts val="0"/>
+                        </a:spcAft>
+                      </a:pPr>
+                      <a:r>
+                        <a:rPr lang="en-CA" sz="2400" b="1" dirty="0">
+                          <a:solidFill>
+                            <a:schemeClr val="tx1">
+                              <a:lumMod val="75000"/>
+                              <a:lumOff val="25000"/>
+                            </a:schemeClr>
+                          </a:solidFill>
+                          <a:effectLst/>
+                        </a:rPr>
+                        <a:t>Support</a:t>
+                      </a:r>
+                      <a:endParaRPr lang="en-CA" sz="2400" b="1" dirty="0">
+                        <a:solidFill>
+                          <a:schemeClr val="tx1">
+                            <a:lumMod val="75000"/>
+                            <a:lumOff val="25000"/>
+                          </a:schemeClr>
+                        </a:solidFill>
+                        <a:effectLst/>
+                        <a:latin typeface="Calibri" panose="020F0502020204030204" pitchFamily="34" charset="0"/>
+                        <a:ea typeface="MS Mincho" panose="02020609040205080304" pitchFamily="49" charset="-128"/>
+                        <a:cs typeface="Arial" panose="020B0604020202020204" pitchFamily="34" charset="0"/>
+                      </a:endParaRPr>
+                    </a:p>
+                  </a:txBody>
+                  <a:tcPr marL="238922" marR="179192" marT="119461" marB="119461">
+                    <a:lnL w="12700" cmpd="sng">
+                      <a:noFill/>
+                      <a:prstDash val="solid"/>
+                    </a:lnL>
+                    <a:lnR w="12700" cmpd="sng">
+                      <a:noFill/>
+                      <a:prstDash val="solid"/>
+                    </a:lnR>
+                    <a:lnT w="9525" cap="flat" cmpd="sng" algn="ctr">
+                      <a:noFill/>
+                      <a:prstDash val="solid"/>
+                    </a:lnT>
+                    <a:lnB w="9525" cap="flat" cmpd="sng" algn="ctr">
+                      <a:solidFill>
+                        <a:srgbClr val="C7C6C1"/>
+                      </a:solidFill>
+                      <a:prstDash val="solid"/>
+                    </a:lnB>
+                    <a:noFill/>
+                  </a:tcPr>
+                </a:tc>
+                <a:tc>
+                  <a:txBody>
+                    <a:bodyPr/>
+                    <a:lstStyle/>
+                    <a:p>
+                      <a:pPr>
+                        <a:lnSpc>
+                          <a:spcPct val="115000"/>
+                        </a:lnSpc>
+                        <a:spcAft>
+                          <a:spcPts val="0"/>
+                        </a:spcAft>
+                      </a:pPr>
+                      <a:r>
+                        <a:rPr lang="en-US" sz="2400" b="1" dirty="0">
+                          <a:solidFill>
+                            <a:schemeClr val="tx1">
+                              <a:lumMod val="75000"/>
+                              <a:lumOff val="25000"/>
+                            </a:schemeClr>
+                          </a:solidFill>
+                          <a:effectLst/>
+                        </a:rPr>
+                        <a:t>Confidence</a:t>
+                      </a:r>
+                      <a:endParaRPr lang="en-CA" sz="2400" b="1" dirty="0">
+                        <a:solidFill>
+                          <a:schemeClr val="tx1">
+                            <a:lumMod val="75000"/>
+                            <a:lumOff val="25000"/>
+                          </a:schemeClr>
+                        </a:solidFill>
+                        <a:effectLst/>
+                      </a:endParaRPr>
+                    </a:p>
+                    <a:p>
+                      <a:pPr>
+                        <a:lnSpc>
+                          <a:spcPct val="115000"/>
+                        </a:lnSpc>
+                        <a:spcAft>
+                          <a:spcPts val="0"/>
+                        </a:spcAft>
+                      </a:pPr>
+                      <a:r>
+                        <a:rPr lang="en-US" sz="2400" b="1" dirty="0">
+                          <a:solidFill>
+                            <a:schemeClr val="tx1">
+                              <a:lumMod val="75000"/>
+                              <a:lumOff val="25000"/>
+                            </a:schemeClr>
+                          </a:solidFill>
+                          <a:effectLst/>
+                        </a:rPr>
+                        <a:t> </a:t>
+                      </a:r>
+                      <a:endParaRPr lang="en-CA" sz="2400" b="1" dirty="0">
+                        <a:solidFill>
+                          <a:schemeClr val="tx1">
+                            <a:lumMod val="75000"/>
+                            <a:lumOff val="25000"/>
+                          </a:schemeClr>
+                        </a:solidFill>
+                        <a:effectLst/>
+                        <a:latin typeface="Calibri" panose="020F0502020204030204" pitchFamily="34" charset="0"/>
+                        <a:ea typeface="Calibri" panose="020F0502020204030204" pitchFamily="34" charset="0"/>
+                        <a:cs typeface="Arial" panose="020B0604020202020204" pitchFamily="34" charset="0"/>
+                      </a:endParaRPr>
+                    </a:p>
+                  </a:txBody>
+                  <a:tcPr marL="238922" marR="179192" marT="119461" marB="119461">
+                    <a:lnL w="12700" cmpd="sng">
+                      <a:noFill/>
+                      <a:prstDash val="solid"/>
+                    </a:lnL>
+                    <a:lnR w="12700" cmpd="sng">
+                      <a:noFill/>
+                      <a:prstDash val="solid"/>
+                    </a:lnR>
+                    <a:lnT w="9525" cap="flat" cmpd="sng" algn="ctr">
+                      <a:noFill/>
+                      <a:prstDash val="solid"/>
+                    </a:lnT>
+                    <a:lnB w="9525" cap="flat" cmpd="sng" algn="ctr">
+                      <a:solidFill>
+                        <a:srgbClr val="C7C6C1"/>
+                      </a:solidFill>
+                      <a:prstDash val="solid"/>
+                    </a:lnB>
+                    <a:noFill/>
+                  </a:tcPr>
+                </a:tc>
+                <a:tc>
+                  <a:txBody>
+                    <a:bodyPr/>
+                    <a:lstStyle/>
+                    <a:p>
+                      <a:pPr>
+                        <a:lnSpc>
+                          <a:spcPct val="115000"/>
+                        </a:lnSpc>
+                        <a:spcAft>
+                          <a:spcPts val="0"/>
+                        </a:spcAft>
+                      </a:pPr>
+                      <a:r>
+                        <a:rPr lang="en-US" sz="2400" b="1" dirty="0">
+                          <a:solidFill>
+                            <a:schemeClr val="tx1">
+                              <a:lumMod val="75000"/>
+                              <a:lumOff val="25000"/>
+                            </a:schemeClr>
+                          </a:solidFill>
+                          <a:effectLst/>
+                        </a:rPr>
+                        <a:t>Lift</a:t>
+                      </a:r>
+                      <a:endParaRPr lang="en-CA" sz="2400" b="1" dirty="0">
+                        <a:solidFill>
+                          <a:schemeClr val="tx1">
+                            <a:lumMod val="75000"/>
+                            <a:lumOff val="25000"/>
+                          </a:schemeClr>
+                        </a:solidFill>
+                        <a:effectLst/>
+                      </a:endParaRPr>
+                    </a:p>
+                    <a:p>
+                      <a:pPr>
+                        <a:lnSpc>
+                          <a:spcPct val="115000"/>
+                        </a:lnSpc>
+                        <a:spcAft>
+                          <a:spcPts val="0"/>
+                        </a:spcAft>
+                      </a:pPr>
+                      <a:r>
+                        <a:rPr lang="en-US" sz="2400" b="1" dirty="0">
+                          <a:solidFill>
+                            <a:schemeClr val="tx1">
+                              <a:lumMod val="75000"/>
+                              <a:lumOff val="25000"/>
+                            </a:schemeClr>
+                          </a:solidFill>
+                          <a:effectLst/>
+                        </a:rPr>
+                        <a:t> </a:t>
+                      </a:r>
+                      <a:endParaRPr lang="en-CA" sz="2400" b="1" dirty="0">
+                        <a:solidFill>
+                          <a:schemeClr val="tx1">
+                            <a:lumMod val="75000"/>
+                            <a:lumOff val="25000"/>
+                          </a:schemeClr>
+                        </a:solidFill>
+                        <a:effectLst/>
+                        <a:latin typeface="Calibri" panose="020F0502020204030204" pitchFamily="34" charset="0"/>
+                        <a:ea typeface="Calibri" panose="020F0502020204030204" pitchFamily="34" charset="0"/>
+                        <a:cs typeface="Arial" panose="020B0604020202020204" pitchFamily="34" charset="0"/>
+                      </a:endParaRPr>
+                    </a:p>
+                  </a:txBody>
+                  <a:tcPr marL="238922" marR="179192" marT="119461" marB="119461">
+                    <a:lnL w="12700" cmpd="sng">
+                      <a:noFill/>
+                      <a:prstDash val="solid"/>
+                    </a:lnL>
+                    <a:lnR w="12700" cmpd="sng">
+                      <a:noFill/>
+                      <a:prstDash val="solid"/>
+                    </a:lnR>
+                    <a:lnT w="9525" cap="flat" cmpd="sng" algn="ctr">
+                      <a:noFill/>
+                      <a:prstDash val="solid"/>
+                    </a:lnT>
+                    <a:lnB w="9525" cap="flat" cmpd="sng" algn="ctr">
+                      <a:solidFill>
+                        <a:srgbClr val="C7C6C1"/>
+                      </a:solidFill>
+                      <a:prstDash val="solid"/>
+                    </a:lnB>
+                    <a:noFill/>
+                  </a:tcPr>
+                </a:tc>
+                <a:tc>
+                  <a:txBody>
+                    <a:bodyPr/>
+                    <a:lstStyle/>
+                    <a:p>
+                      <a:pPr>
+                        <a:lnSpc>
+                          <a:spcPct val="115000"/>
+                        </a:lnSpc>
+                        <a:spcAft>
+                          <a:spcPts val="0"/>
+                        </a:spcAft>
+                      </a:pPr>
+                      <a:r>
+                        <a:rPr lang="en-US" sz="2400" b="1" dirty="0">
+                          <a:solidFill>
+                            <a:schemeClr val="tx1">
+                              <a:lumMod val="75000"/>
+                              <a:lumOff val="25000"/>
+                            </a:schemeClr>
+                          </a:solidFill>
+                          <a:effectLst/>
+                        </a:rPr>
+                        <a:t>Count</a:t>
+                      </a:r>
+                      <a:endParaRPr lang="en-CA" sz="2400" b="1" dirty="0">
+                        <a:solidFill>
+                          <a:schemeClr val="tx1">
+                            <a:lumMod val="75000"/>
+                            <a:lumOff val="25000"/>
+                          </a:schemeClr>
+                        </a:solidFill>
+                        <a:effectLst/>
+                      </a:endParaRPr>
+                    </a:p>
+                    <a:p>
+                      <a:pPr>
+                        <a:lnSpc>
+                          <a:spcPct val="115000"/>
+                        </a:lnSpc>
+                        <a:spcAft>
+                          <a:spcPts val="0"/>
+                        </a:spcAft>
+                      </a:pPr>
+                      <a:r>
+                        <a:rPr lang="en-US" sz="2400" b="1" dirty="0">
+                          <a:solidFill>
+                            <a:schemeClr val="tx1">
+                              <a:lumMod val="75000"/>
+                              <a:lumOff val="25000"/>
+                            </a:schemeClr>
+                          </a:solidFill>
+                          <a:effectLst/>
+                        </a:rPr>
+                        <a:t> </a:t>
+                      </a:r>
+                      <a:endParaRPr lang="en-CA" sz="2400" b="1" dirty="0">
+                        <a:solidFill>
+                          <a:schemeClr val="tx1">
+                            <a:lumMod val="75000"/>
+                            <a:lumOff val="25000"/>
+                          </a:schemeClr>
+                        </a:solidFill>
+                        <a:effectLst/>
+                        <a:latin typeface="Calibri" panose="020F0502020204030204" pitchFamily="34" charset="0"/>
+                        <a:ea typeface="Calibri" panose="020F0502020204030204" pitchFamily="34" charset="0"/>
+                        <a:cs typeface="Arial" panose="020B0604020202020204" pitchFamily="34" charset="0"/>
+                      </a:endParaRPr>
+                    </a:p>
+                  </a:txBody>
+                  <a:tcPr marL="238922" marR="179192" marT="119461" marB="119461">
+                    <a:lnL w="12700" cmpd="sng">
+                      <a:noFill/>
+                      <a:prstDash val="solid"/>
+                    </a:lnL>
+                    <a:lnR w="12700" cmpd="sng">
+                      <a:noFill/>
+                      <a:prstDash val="solid"/>
+                    </a:lnR>
+                    <a:lnT w="9525" cap="flat" cmpd="sng" algn="ctr">
+                      <a:noFill/>
+                      <a:prstDash val="solid"/>
+                    </a:lnT>
+                    <a:lnB w="9525" cap="flat" cmpd="sng" algn="ctr">
+                      <a:solidFill>
+                        <a:srgbClr val="C7C6C1"/>
+                      </a:solidFill>
+                      <a:prstDash val="solid"/>
+                    </a:lnB>
+                    <a:noFill/>
+                  </a:tcPr>
+                </a:tc>
+                <a:extLst>
+                  <a:ext uri="{0D108BD9-81ED-4DB2-BD59-A6C34878D82A}">
+                    <a16:rowId xmlns:a16="http://schemas.microsoft.com/office/drawing/2014/main" val="3378592721"/>
+                  </a:ext>
+                </a:extLst>
+              </a:tr>
+              <a:tr h="1755831">
+                <a:tc>
+                  <a:txBody>
+                    <a:bodyPr/>
+                    <a:lstStyle/>
+                    <a:p>
+                      <a:pPr>
+                        <a:lnSpc>
+                          <a:spcPct val="115000"/>
+                        </a:lnSpc>
+                        <a:spcAft>
+                          <a:spcPts val="0"/>
+                        </a:spcAft>
+                      </a:pPr>
+                      <a:r>
+                        <a:rPr lang="en-US" sz="1700" b="1" dirty="0">
+                          <a:solidFill>
+                            <a:schemeClr val="tx1">
+                              <a:lumMod val="75000"/>
+                              <a:lumOff val="25000"/>
+                            </a:schemeClr>
+                          </a:solidFill>
+                          <a:effectLst/>
+                        </a:rPr>
+                        <a:t>1</a:t>
+                      </a:r>
+                      <a:endParaRPr lang="en-CA" sz="1700" b="1" dirty="0">
+                        <a:solidFill>
+                          <a:schemeClr val="tx1">
+                            <a:lumMod val="75000"/>
+                            <a:lumOff val="25000"/>
+                          </a:schemeClr>
+                        </a:solidFill>
+                        <a:effectLst/>
+                        <a:latin typeface="Calibri" panose="020F0502020204030204" pitchFamily="34" charset="0"/>
+                        <a:ea typeface="Calibri" panose="020F0502020204030204" pitchFamily="34" charset="0"/>
+                        <a:cs typeface="Arial" panose="020B0604020202020204" pitchFamily="34" charset="0"/>
+                      </a:endParaRPr>
+                    </a:p>
+                  </a:txBody>
+                  <a:tcPr marL="238922" marR="179192" marT="119461" marB="119461">
+                    <a:lnL w="19050" cap="flat" cmpd="sng" algn="ctr">
+                      <a:noFill/>
+                      <a:prstDash val="solid"/>
+                    </a:lnL>
+                    <a:lnR w="9525" cap="flat" cmpd="sng" algn="ctr">
+                      <a:solidFill>
+                        <a:srgbClr val="C7C6C1"/>
+                      </a:solidFill>
+                      <a:prstDash val="solid"/>
+                    </a:lnR>
+                    <a:lnT w="9525" cap="flat" cmpd="sng" algn="ctr">
+                      <a:solidFill>
+                        <a:srgbClr val="C7C6C1"/>
+                      </a:solidFill>
+                      <a:prstDash val="solid"/>
+                    </a:lnT>
+                    <a:lnB w="12700" cmpd="sng">
+                      <a:noFill/>
+                      <a:prstDash val="solid"/>
+                    </a:lnB>
+                    <a:noFill/>
+                  </a:tcPr>
+                </a:tc>
+                <a:tc>
+                  <a:txBody>
+                    <a:bodyPr/>
+                    <a:lstStyle/>
+                    <a:p>
+                      <a:pPr>
+                        <a:lnSpc>
+                          <a:spcPct val="115000"/>
+                        </a:lnSpc>
+                        <a:spcAft>
+                          <a:spcPts val="0"/>
+                        </a:spcAft>
+                      </a:pPr>
+                      <a:r>
+                        <a:rPr lang="en-US" sz="1700" dirty="0">
+                          <a:solidFill>
+                            <a:schemeClr val="tx1">
+                              <a:lumMod val="75000"/>
+                              <a:lumOff val="25000"/>
+                            </a:schemeClr>
+                          </a:solidFill>
+                          <a:effectLst/>
+                        </a:rPr>
+                        <a:t>Sex=Females </a:t>
+                      </a:r>
+                      <a:endParaRPr lang="en-CA" sz="1700" dirty="0">
+                        <a:solidFill>
+                          <a:schemeClr val="tx1">
+                            <a:lumMod val="75000"/>
+                            <a:lumOff val="25000"/>
+                          </a:schemeClr>
+                        </a:solidFill>
+                        <a:effectLst/>
+                      </a:endParaRPr>
+                    </a:p>
+                    <a:p>
+                      <a:pPr>
+                        <a:lnSpc>
+                          <a:spcPct val="115000"/>
+                        </a:lnSpc>
+                        <a:spcAft>
+                          <a:spcPts val="0"/>
+                        </a:spcAft>
+                      </a:pPr>
+                      <a:r>
+                        <a:rPr lang="en-US" sz="1700" dirty="0" err="1">
+                          <a:solidFill>
+                            <a:schemeClr val="tx1">
+                              <a:lumMod val="75000"/>
+                              <a:lumOff val="25000"/>
+                            </a:schemeClr>
+                          </a:solidFill>
+                          <a:effectLst/>
+                        </a:rPr>
+                        <a:t>Family.status</a:t>
+                      </a:r>
+                      <a:r>
+                        <a:rPr lang="en-US" sz="1700" dirty="0">
+                          <a:solidFill>
+                            <a:schemeClr val="tx1">
+                              <a:lumMod val="75000"/>
+                              <a:lumOff val="25000"/>
+                            </a:schemeClr>
+                          </a:solidFill>
+                          <a:effectLst/>
+                        </a:rPr>
+                        <a:t>=Dependents</a:t>
+                      </a:r>
+                      <a:endParaRPr lang="en-CA" sz="1700" dirty="0">
+                        <a:solidFill>
+                          <a:schemeClr val="tx1">
+                            <a:lumMod val="75000"/>
+                            <a:lumOff val="25000"/>
+                          </a:schemeClr>
+                        </a:solidFill>
+                        <a:effectLst/>
+                      </a:endParaRPr>
+                    </a:p>
+                    <a:p>
+                      <a:pPr>
+                        <a:lnSpc>
+                          <a:spcPct val="115000"/>
+                        </a:lnSpc>
+                        <a:spcAft>
+                          <a:spcPts val="0"/>
+                        </a:spcAft>
+                      </a:pPr>
+                      <a:r>
+                        <a:rPr lang="en-US" sz="1700" dirty="0" err="1">
+                          <a:solidFill>
+                            <a:schemeClr val="tx1">
+                              <a:lumMod val="75000"/>
+                              <a:lumOff val="25000"/>
+                            </a:schemeClr>
+                          </a:solidFill>
+                          <a:effectLst/>
+                        </a:rPr>
+                        <a:t>Landing.age.group</a:t>
+                      </a:r>
+                      <a:r>
+                        <a:rPr lang="en-US" sz="1700" dirty="0">
+                          <a:solidFill>
+                            <a:schemeClr val="tx1">
+                              <a:lumMod val="75000"/>
+                              <a:lumOff val="25000"/>
+                            </a:schemeClr>
+                          </a:solidFill>
+                          <a:effectLst/>
+                        </a:rPr>
+                        <a:t>=Less than 20 years</a:t>
+                      </a:r>
+                      <a:endParaRPr lang="en-CA" sz="1700" dirty="0">
+                        <a:solidFill>
+                          <a:schemeClr val="tx1">
+                            <a:lumMod val="75000"/>
+                            <a:lumOff val="25000"/>
+                          </a:schemeClr>
+                        </a:solidFill>
+                        <a:effectLst/>
+                        <a:latin typeface="Calibri" panose="020F0502020204030204" pitchFamily="34" charset="0"/>
+                        <a:ea typeface="Calibri" panose="020F0502020204030204" pitchFamily="34" charset="0"/>
+                        <a:cs typeface="Arial" panose="020B0604020202020204" pitchFamily="34" charset="0"/>
+                      </a:endParaRPr>
+                    </a:p>
+                  </a:txBody>
+                  <a:tcPr marL="238922" marR="179192" marT="119461" marB="119461">
+                    <a:lnL w="9525" cap="flat" cmpd="sng" algn="ctr">
+                      <a:solidFill>
+                        <a:srgbClr val="C7C6C1"/>
+                      </a:solidFill>
+                      <a:prstDash val="solid"/>
+                    </a:lnL>
+                    <a:lnR w="12700" cmpd="sng">
+                      <a:noFill/>
+                      <a:prstDash val="solid"/>
+                    </a:lnR>
+                    <a:lnT w="9525" cap="flat" cmpd="sng" algn="ctr">
+                      <a:solidFill>
+                        <a:srgbClr val="C7C6C1"/>
+                      </a:solidFill>
+                      <a:prstDash val="solid"/>
+                    </a:lnT>
+                    <a:lnB w="12700" cmpd="sng">
+                      <a:noFill/>
+                      <a:prstDash val="solid"/>
+                    </a:lnB>
+                    <a:noFill/>
+                  </a:tcPr>
+                </a:tc>
+                <a:tc>
+                  <a:txBody>
+                    <a:bodyPr/>
+                    <a:lstStyle/>
+                    <a:p>
+                      <a:pPr>
+                        <a:lnSpc>
+                          <a:spcPct val="115000"/>
+                        </a:lnSpc>
+                        <a:spcAft>
+                          <a:spcPts val="0"/>
+                        </a:spcAft>
+                      </a:pPr>
+                      <a:r>
+                        <a:rPr lang="en-CA" sz="1700" dirty="0">
+                          <a:solidFill>
+                            <a:schemeClr val="tx1">
+                              <a:lumMod val="75000"/>
+                              <a:lumOff val="25000"/>
+                            </a:schemeClr>
+                          </a:solidFill>
+                          <a:effectLst/>
+                        </a:rPr>
+                        <a:t>0.01245406 </a:t>
+                      </a:r>
+                      <a:r>
+                        <a:rPr lang="en-US" sz="1700" dirty="0">
+                          <a:solidFill>
+                            <a:schemeClr val="tx1">
+                              <a:lumMod val="75000"/>
+                              <a:lumOff val="25000"/>
+                            </a:schemeClr>
+                          </a:solidFill>
+                          <a:effectLst/>
+                        </a:rPr>
+                        <a:t> </a:t>
+                      </a:r>
+                      <a:endParaRPr lang="en-CA" sz="1700" dirty="0">
+                        <a:solidFill>
+                          <a:schemeClr val="tx1">
+                            <a:lumMod val="75000"/>
+                            <a:lumOff val="25000"/>
+                          </a:schemeClr>
+                        </a:solidFill>
+                        <a:effectLst/>
+                        <a:latin typeface="Calibri" panose="020F0502020204030204" pitchFamily="34" charset="0"/>
+                        <a:ea typeface="Calibri" panose="020F0502020204030204" pitchFamily="34" charset="0"/>
+                        <a:cs typeface="Arial" panose="020B0604020202020204" pitchFamily="34" charset="0"/>
+                      </a:endParaRPr>
+                    </a:p>
+                  </a:txBody>
+                  <a:tcPr marL="238922" marR="179192" marT="119461" marB="119461">
+                    <a:lnL w="12700" cmpd="sng">
+                      <a:noFill/>
+                      <a:prstDash val="solid"/>
+                    </a:lnL>
+                    <a:lnR w="12700" cmpd="sng">
+                      <a:noFill/>
+                      <a:prstDash val="solid"/>
+                    </a:lnR>
+                    <a:lnT w="9525" cap="flat" cmpd="sng" algn="ctr">
+                      <a:solidFill>
+                        <a:srgbClr val="C7C6C1"/>
+                      </a:solidFill>
+                      <a:prstDash val="solid"/>
+                    </a:lnT>
+                    <a:lnB w="12700" cmpd="sng">
+                      <a:noFill/>
+                      <a:prstDash val="solid"/>
+                    </a:lnB>
+                    <a:noFill/>
+                  </a:tcPr>
+                </a:tc>
+                <a:tc>
+                  <a:txBody>
+                    <a:bodyPr/>
+                    <a:lstStyle/>
+                    <a:p>
+                      <a:pPr>
+                        <a:lnSpc>
+                          <a:spcPct val="115000"/>
+                        </a:lnSpc>
+                        <a:spcAft>
+                          <a:spcPts val="0"/>
+                        </a:spcAft>
+                      </a:pPr>
+                      <a:r>
+                        <a:rPr lang="en-CA" sz="1700" dirty="0">
+                          <a:solidFill>
+                            <a:schemeClr val="tx1">
+                              <a:lumMod val="75000"/>
+                              <a:lumOff val="25000"/>
+                            </a:schemeClr>
+                          </a:solidFill>
+                          <a:effectLst/>
+                        </a:rPr>
+                        <a:t>0.622449 </a:t>
+                      </a:r>
+                      <a:r>
+                        <a:rPr lang="en-US" sz="1700" dirty="0">
+                          <a:solidFill>
+                            <a:schemeClr val="tx1">
+                              <a:lumMod val="75000"/>
+                              <a:lumOff val="25000"/>
+                            </a:schemeClr>
+                          </a:solidFill>
+                          <a:effectLst/>
+                        </a:rPr>
+                        <a:t> </a:t>
+                      </a:r>
+                      <a:endParaRPr lang="en-CA" sz="1700" dirty="0">
+                        <a:solidFill>
+                          <a:schemeClr val="tx1">
+                            <a:lumMod val="75000"/>
+                            <a:lumOff val="25000"/>
+                          </a:schemeClr>
+                        </a:solidFill>
+                        <a:effectLst/>
+                        <a:latin typeface="Calibri" panose="020F0502020204030204" pitchFamily="34" charset="0"/>
+                        <a:ea typeface="Calibri" panose="020F0502020204030204" pitchFamily="34" charset="0"/>
+                        <a:cs typeface="Arial" panose="020B0604020202020204" pitchFamily="34" charset="0"/>
+                      </a:endParaRPr>
+                    </a:p>
+                  </a:txBody>
+                  <a:tcPr marL="238922" marR="179192" marT="119461" marB="119461">
+                    <a:lnL w="12700" cmpd="sng">
+                      <a:noFill/>
+                      <a:prstDash val="solid"/>
+                    </a:lnL>
+                    <a:lnR w="12700" cmpd="sng">
+                      <a:noFill/>
+                      <a:prstDash val="solid"/>
+                    </a:lnR>
+                    <a:lnT w="9525" cap="flat" cmpd="sng" algn="ctr">
+                      <a:solidFill>
+                        <a:srgbClr val="C7C6C1"/>
+                      </a:solidFill>
+                      <a:prstDash val="solid"/>
+                    </a:lnT>
+                    <a:lnB w="12700" cmpd="sng">
+                      <a:noFill/>
+                      <a:prstDash val="solid"/>
+                    </a:lnB>
+                    <a:noFill/>
+                  </a:tcPr>
+                </a:tc>
+                <a:tc>
+                  <a:txBody>
+                    <a:bodyPr/>
+                    <a:lstStyle/>
+                    <a:p>
+                      <a:pPr>
+                        <a:lnSpc>
+                          <a:spcPct val="115000"/>
+                        </a:lnSpc>
+                        <a:spcAft>
+                          <a:spcPts val="0"/>
+                        </a:spcAft>
+                      </a:pPr>
+                      <a:r>
+                        <a:rPr lang="en-CA" sz="1700" dirty="0">
+                          <a:solidFill>
+                            <a:schemeClr val="tx1">
+                              <a:lumMod val="75000"/>
+                              <a:lumOff val="25000"/>
+                            </a:schemeClr>
+                          </a:solidFill>
+                          <a:effectLst/>
+                        </a:rPr>
+                        <a:t>6.049117 </a:t>
+                      </a:r>
+                      <a:r>
+                        <a:rPr lang="en-US" sz="1700" dirty="0">
+                          <a:solidFill>
+                            <a:schemeClr val="tx1">
+                              <a:lumMod val="75000"/>
+                              <a:lumOff val="25000"/>
+                            </a:schemeClr>
+                          </a:solidFill>
+                          <a:effectLst/>
+                        </a:rPr>
+                        <a:t> </a:t>
+                      </a:r>
+                      <a:endParaRPr lang="en-CA" sz="1700" dirty="0">
+                        <a:solidFill>
+                          <a:schemeClr val="tx1">
+                            <a:lumMod val="75000"/>
+                            <a:lumOff val="25000"/>
+                          </a:schemeClr>
+                        </a:solidFill>
+                        <a:effectLst/>
+                        <a:latin typeface="Calibri" panose="020F0502020204030204" pitchFamily="34" charset="0"/>
+                        <a:ea typeface="Calibri" panose="020F0502020204030204" pitchFamily="34" charset="0"/>
+                        <a:cs typeface="Arial" panose="020B0604020202020204" pitchFamily="34" charset="0"/>
+                      </a:endParaRPr>
+                    </a:p>
+                  </a:txBody>
+                  <a:tcPr marL="238922" marR="179192" marT="119461" marB="119461">
+                    <a:lnL w="12700" cmpd="sng">
+                      <a:noFill/>
+                      <a:prstDash val="solid"/>
+                    </a:lnL>
+                    <a:lnR w="12700" cmpd="sng">
+                      <a:noFill/>
+                      <a:prstDash val="solid"/>
+                    </a:lnR>
+                    <a:lnT w="9525" cap="flat" cmpd="sng" algn="ctr">
+                      <a:solidFill>
+                        <a:srgbClr val="C7C6C1"/>
+                      </a:solidFill>
+                      <a:prstDash val="solid"/>
+                    </a:lnT>
+                    <a:lnB w="12700" cmpd="sng">
+                      <a:noFill/>
+                      <a:prstDash val="solid"/>
+                    </a:lnB>
+                    <a:noFill/>
+                  </a:tcPr>
+                </a:tc>
+                <a:tc>
+                  <a:txBody>
+                    <a:bodyPr/>
+                    <a:lstStyle/>
+                    <a:p>
+                      <a:pPr>
+                        <a:lnSpc>
+                          <a:spcPct val="115000"/>
+                        </a:lnSpc>
+                        <a:spcAft>
+                          <a:spcPts val="0"/>
+                        </a:spcAft>
+                      </a:pPr>
+                      <a:r>
+                        <a:rPr lang="en-CA" sz="1700" dirty="0">
+                          <a:solidFill>
+                            <a:schemeClr val="tx1">
+                              <a:lumMod val="75000"/>
+                              <a:lumOff val="25000"/>
+                            </a:schemeClr>
+                          </a:solidFill>
+                          <a:effectLst/>
+                        </a:rPr>
+                        <a:t>61 </a:t>
+                      </a:r>
+                      <a:r>
+                        <a:rPr lang="en-US" sz="1700" dirty="0">
+                          <a:solidFill>
+                            <a:schemeClr val="tx1">
+                              <a:lumMod val="75000"/>
+                              <a:lumOff val="25000"/>
+                            </a:schemeClr>
+                          </a:solidFill>
+                          <a:effectLst/>
+                        </a:rPr>
+                        <a:t> </a:t>
+                      </a:r>
+                      <a:endParaRPr lang="en-CA" sz="1700" dirty="0">
+                        <a:solidFill>
+                          <a:schemeClr val="tx1">
+                            <a:lumMod val="75000"/>
+                            <a:lumOff val="25000"/>
+                          </a:schemeClr>
+                        </a:solidFill>
+                        <a:effectLst/>
+                        <a:latin typeface="Calibri" panose="020F0502020204030204" pitchFamily="34" charset="0"/>
+                        <a:ea typeface="Calibri" panose="020F0502020204030204" pitchFamily="34" charset="0"/>
+                        <a:cs typeface="Arial" panose="020B0604020202020204" pitchFamily="34" charset="0"/>
+                      </a:endParaRPr>
+                    </a:p>
+                  </a:txBody>
+                  <a:tcPr marL="238922" marR="179192" marT="119461" marB="119461">
+                    <a:lnL w="12700" cmpd="sng">
+                      <a:noFill/>
+                      <a:prstDash val="solid"/>
+                    </a:lnL>
+                    <a:lnR w="12700" cmpd="sng">
+                      <a:noFill/>
+                      <a:prstDash val="solid"/>
+                    </a:lnR>
+                    <a:lnT w="9525" cap="flat" cmpd="sng" algn="ctr">
+                      <a:solidFill>
+                        <a:srgbClr val="C7C6C1"/>
+                      </a:solidFill>
+                      <a:prstDash val="solid"/>
+                    </a:lnT>
+                    <a:lnB w="12700" cmpd="sng">
+                      <a:noFill/>
+                      <a:prstDash val="solid"/>
+                    </a:lnB>
+                    <a:noFill/>
+                  </a:tcPr>
+                </a:tc>
+                <a:extLst>
+                  <a:ext uri="{0D108BD9-81ED-4DB2-BD59-A6C34878D82A}">
+                    <a16:rowId xmlns:a16="http://schemas.microsoft.com/office/drawing/2014/main" val="3777189939"/>
+                  </a:ext>
+                </a:extLst>
+              </a:tr>
+            </a:tbl>
+          </a:graphicData>
+        </a:graphic>
+      </p:graphicFrame>
     </p:spTree>
     <p:extLst>
       <p:ext uri="{BB962C8B-B14F-4D97-AF65-F5344CB8AC3E}">
-        <p14:creationId xmlns:p14="http://schemas.microsoft.com/office/powerpoint/2010/main" val="1493758397"/>
+        <p14:creationId xmlns:p14="http://schemas.microsoft.com/office/powerpoint/2010/main" val="2726078564"/>
       </p:ext>
     </p:extLst>
   </p:cSld>
@@ -6640,10 +7682,10 @@
       </p:grpSpPr>
       <p:sp>
         <p:nvSpPr>
-          <p:cNvPr id="13" name="Rectangle 12">
-            <a:extLst>
-              <a:ext uri="{FF2B5EF4-FFF2-40B4-BE49-F238E27FC236}">
-                <a16:creationId xmlns:a16="http://schemas.microsoft.com/office/drawing/2014/main" id="{6753252F-4873-4F63-801D-CC719279A7D5}"/>
+          <p:cNvPr id="10" name="Rectangle 9">
+            <a:extLst>
+              <a:ext uri="{FF2B5EF4-FFF2-40B4-BE49-F238E27FC236}">
+                <a16:creationId xmlns:a16="http://schemas.microsoft.com/office/drawing/2014/main" id="{A4AC5506-6312-4701-8D3C-40187889A947}"/>
               </a:ext>
               <a:ext uri="{C183D7F6-B498-43B3-948B-1728B52AA6E4}">
                 <adec:decorative xmlns:adec="http://schemas.microsoft.com/office/drawing/2017/decorative" val="1"/>
@@ -6663,14 +7705,14 @@
         </p:nvSpPr>
         <p:spPr>
           <a:xfrm>
-            <a:off x="0" y="0"/>
-            <a:ext cx="12192000" cy="6858000"/>
+            <a:off x="0" y="651752"/>
+            <a:ext cx="12192000" cy="736551"/>
           </a:xfrm>
           <a:prstGeom prst="rect">
             <a:avLst/>
           </a:prstGeom>
           <a:solidFill>
-            <a:srgbClr val="FFFFFF"/>
+            <a:schemeClr val="tx1"/>
           </a:solidFill>
           <a:ln>
             <a:noFill/>
@@ -6703,69 +7745,6 @@
       </p:sp>
       <p:sp>
         <p:nvSpPr>
-          <p:cNvPr id="15" name="Rectangle 14">
-            <a:extLst>
-              <a:ext uri="{FF2B5EF4-FFF2-40B4-BE49-F238E27FC236}">
-                <a16:creationId xmlns:a16="http://schemas.microsoft.com/office/drawing/2014/main" id="{047C8CCB-F95D-4249-92DD-651249D3535A}"/>
-              </a:ext>
-              <a:ext uri="{C183D7F6-B498-43B3-948B-1728B52AA6E4}">
-                <adec:decorative xmlns:adec="http://schemas.microsoft.com/office/drawing/2017/decorative" val="1"/>
-              </a:ext>
-            </a:extLst>
-          </p:cNvPr>
-          <p:cNvSpPr>
-            <a:spLocks noGrp="1" noRot="1" noChangeAspect="1" noMove="1" noResize="1" noEditPoints="1" noAdjustHandles="1" noChangeArrowheads="1" noChangeShapeType="1" noTextEdit="1"/>
-          </p:cNvSpPr>
-          <p:nvPr>
-            <p:extLst>
-              <p:ext uri="{386F3935-93C4-4BCD-93E2-E3B085C9AB24}">
-                <p16:designElem xmlns:p16="http://schemas.microsoft.com/office/powerpoint/2015/main" val="1"/>
-              </p:ext>
-            </p:extLst>
-          </p:nvPr>
-        </p:nvSpPr>
-        <p:spPr>
-          <a:xfrm>
-            <a:off x="0" y="0"/>
-            <a:ext cx="2013557" cy="6858000"/>
-          </a:xfrm>
-          <a:prstGeom prst="rect">
-            <a:avLst/>
-          </a:prstGeom>
-          <a:solidFill>
-            <a:srgbClr val="2F3250"/>
-          </a:solidFill>
-          <a:ln>
-            <a:noFill/>
-          </a:ln>
-        </p:spPr>
-        <p:style>
-          <a:lnRef idx="2">
-            <a:schemeClr val="accent1">
-              <a:shade val="50000"/>
-            </a:schemeClr>
-          </a:lnRef>
-          <a:fillRef idx="1">
-            <a:schemeClr val="accent1"/>
-          </a:fillRef>
-          <a:effectRef idx="0">
-            <a:schemeClr val="accent1"/>
-          </a:effectRef>
-          <a:fontRef idx="minor">
-            <a:schemeClr val="lt1"/>
-          </a:fontRef>
-        </p:style>
-        <p:txBody>
-          <a:bodyPr rtlCol="0" anchor="ctr"/>
-          <a:lstStyle/>
-          <a:p>
-            <a:pPr algn="ctr"/>
-            <a:endParaRPr lang="en-US"/>
-          </a:p>
-        </p:txBody>
-      </p:sp>
-      <p:sp>
-        <p:nvSpPr>
           <p:cNvPr id="2" name="Title 1">
             <a:extLst>
               <a:ext uri="{FF2B5EF4-FFF2-40B4-BE49-F238E27FC236}">
@@ -6782,20 +7761,9 @@
         </p:nvSpPr>
         <p:spPr>
           <a:xfrm>
-            <a:off x="885190" y="2318294"/>
-            <a:ext cx="2256734" cy="2221412"/>
+            <a:off x="556532" y="643467"/>
+            <a:ext cx="11210925" cy="744836"/>
           </a:xfrm>
-          <a:prstGeom prst="ellipse">
-            <a:avLst/>
-          </a:prstGeom>
-          <a:solidFill>
-            <a:srgbClr val="262626"/>
-          </a:solidFill>
-          <a:ln w="174625" cmpd="thinThick">
-            <a:solidFill>
-              <a:srgbClr val="262626"/>
-            </a:solidFill>
-          </a:ln>
         </p:spPr>
         <p:txBody>
           <a:bodyPr vert="horz" lIns="91440" tIns="45720" rIns="91440" bIns="45720" rtlCol="0" anchor="ctr">
@@ -6805,9 +7773,9 @@
           <a:p>
             <a:pPr algn="ctr"/>
             <a:r>
-              <a:rPr lang="en-US" sz="2600" kern="1200" dirty="0" err="1">
+              <a:rPr lang="en-US" sz="3200" kern="1200" dirty="0" err="1">
                 <a:solidFill>
-                  <a:srgbClr val="FFFFFF"/>
+                  <a:schemeClr val="bg1"/>
                 </a:solidFill>
                 <a:latin typeface="+mj-lt"/>
                 <a:ea typeface="+mj-ea"/>
@@ -6816,9 +7784,9 @@
               <a:t>Apriori</a:t>
             </a:r>
             <a:r>
-              <a:rPr lang="en-US" sz="2600" kern="1200" dirty="0">
+              <a:rPr lang="en-US" sz="3200" kern="1200" dirty="0">
                 <a:solidFill>
-                  <a:srgbClr val="FFFFFF"/>
+                  <a:schemeClr val="bg1"/>
                 </a:solidFill>
                 <a:latin typeface="+mj-lt"/>
                 <a:ea typeface="+mj-ea"/>
@@ -6829,40 +7797,2218 @@
           </a:p>
         </p:txBody>
       </p:sp>
-      <p:pic>
-        <p:nvPicPr>
-          <p:cNvPr id="3" name="Picture 2">
-            <a:extLst>
-              <a:ext uri="{FF2B5EF4-FFF2-40B4-BE49-F238E27FC236}">
-                <a16:creationId xmlns:a16="http://schemas.microsoft.com/office/drawing/2014/main" id="{59E8625C-4D44-4993-9431-18270CB88E4E}"/>
-              </a:ext>
-            </a:extLst>
-          </p:cNvPr>
-          <p:cNvPicPr>
-            <a:picLocks noChangeAspect="1"/>
-          </p:cNvPicPr>
-          <p:nvPr/>
-        </p:nvPicPr>
-        <p:blipFill>
-          <a:blip r:embed="rId2"/>
-          <a:stretch>
-            <a:fillRect/>
-          </a:stretch>
-        </p:blipFill>
-        <p:spPr>
-          <a:xfrm>
-            <a:off x="3943350" y="1640935"/>
-            <a:ext cx="7188199" cy="3576129"/>
-          </a:xfrm>
-          <a:prstGeom prst="rect">
-            <a:avLst/>
-          </a:prstGeom>
-        </p:spPr>
-      </p:pic>
+      <p:graphicFrame>
+        <p:nvGraphicFramePr>
+          <p:cNvPr id="5" name="Table 4">
+            <a:extLst>
+              <a:ext uri="{FF2B5EF4-FFF2-40B4-BE49-F238E27FC236}">
+                <a16:creationId xmlns:a16="http://schemas.microsoft.com/office/drawing/2014/main" id="{F01F8089-FE7F-4F3B-9D29-DE2DEBEAA6C3}"/>
+              </a:ext>
+            </a:extLst>
+          </p:cNvPr>
+          <p:cNvGraphicFramePr>
+            <a:graphicFrameLocks noGrp="1"/>
+          </p:cNvGraphicFramePr>
+          <p:nvPr>
+            <p:extLst>
+              <p:ext uri="{D42A27DB-BD31-4B8C-83A1-F6EECF244321}">
+                <p14:modId xmlns:p14="http://schemas.microsoft.com/office/powerpoint/2010/main" val="1537138678"/>
+              </p:ext>
+            </p:extLst>
+          </p:nvPr>
+        </p:nvGraphicFramePr>
+        <p:xfrm>
+          <a:off x="556532" y="1490761"/>
+          <a:ext cx="11210925" cy="4510901"/>
+        </p:xfrm>
+        <a:graphic>
+          <a:graphicData uri="http://schemas.openxmlformats.org/drawingml/2006/table">
+            <a:tbl>
+              <a:tblPr firstRow="1" firstCol="1" bandRow="1">
+                <a:noFill/>
+                <a:tableStyleId>{5C22544A-7EE6-4342-B048-85BDC9FD1C3A}</a:tableStyleId>
+              </a:tblPr>
+              <a:tblGrid>
+                <a:gridCol w="839131">
+                  <a:extLst>
+                    <a:ext uri="{9D8B030D-6E8A-4147-A177-3AD203B41FA5}">
+                      <a16:colId xmlns:a16="http://schemas.microsoft.com/office/drawing/2014/main" val="2614266101"/>
+                    </a:ext>
+                  </a:extLst>
+                </a:gridCol>
+                <a:gridCol w="3364614">
+                  <a:extLst>
+                    <a:ext uri="{9D8B030D-6E8A-4147-A177-3AD203B41FA5}">
+                      <a16:colId xmlns:a16="http://schemas.microsoft.com/office/drawing/2014/main" val="3617011815"/>
+                    </a:ext>
+                  </a:extLst>
+                </a:gridCol>
+                <a:gridCol w="1871601">
+                  <a:extLst>
+                    <a:ext uri="{9D8B030D-6E8A-4147-A177-3AD203B41FA5}">
+                      <a16:colId xmlns:a16="http://schemas.microsoft.com/office/drawing/2014/main" val="270380389"/>
+                    </a:ext>
+                  </a:extLst>
+                </a:gridCol>
+                <a:gridCol w="2017098">
+                  <a:extLst>
+                    <a:ext uri="{9D8B030D-6E8A-4147-A177-3AD203B41FA5}">
+                      <a16:colId xmlns:a16="http://schemas.microsoft.com/office/drawing/2014/main" val="1316107225"/>
+                    </a:ext>
+                  </a:extLst>
+                </a:gridCol>
+                <a:gridCol w="1624271">
+                  <a:extLst>
+                    <a:ext uri="{9D8B030D-6E8A-4147-A177-3AD203B41FA5}">
+                      <a16:colId xmlns:a16="http://schemas.microsoft.com/office/drawing/2014/main" val="3429808337"/>
+                    </a:ext>
+                  </a:extLst>
+                </a:gridCol>
+                <a:gridCol w="1494210">
+                  <a:extLst>
+                    <a:ext uri="{9D8B030D-6E8A-4147-A177-3AD203B41FA5}">
+                      <a16:colId xmlns:a16="http://schemas.microsoft.com/office/drawing/2014/main" val="4240416313"/>
+                    </a:ext>
+                  </a:extLst>
+                </a:gridCol>
+              </a:tblGrid>
+              <a:tr h="601731">
+                <a:tc>
+                  <a:txBody>
+                    <a:bodyPr/>
+                    <a:lstStyle/>
+                    <a:p>
+                      <a:pPr marL="0" algn="l" defTabSz="914400" rtl="0" eaLnBrk="1" latinLnBrk="0" hangingPunct="1">
+                        <a:lnSpc>
+                          <a:spcPct val="115000"/>
+                        </a:lnSpc>
+                        <a:spcAft>
+                          <a:spcPts val="0"/>
+                        </a:spcAft>
+                      </a:pPr>
+                      <a:r>
+                        <a:rPr lang="en-US" sz="2400" b="1" kern="1200" dirty="0">
+                          <a:solidFill>
+                            <a:schemeClr val="tx1">
+                              <a:lumMod val="75000"/>
+                              <a:lumOff val="25000"/>
+                            </a:schemeClr>
+                          </a:solidFill>
+                          <a:effectLst/>
+                          <a:latin typeface="+mn-lt"/>
+                          <a:ea typeface="+mn-ea"/>
+                          <a:cs typeface="+mn-cs"/>
+                        </a:rPr>
+                        <a:t>Rule</a:t>
+                      </a:r>
+                      <a:endParaRPr lang="en-CA" sz="2400" b="1" kern="1200" dirty="0">
+                        <a:solidFill>
+                          <a:schemeClr val="tx1">
+                            <a:lumMod val="75000"/>
+                            <a:lumOff val="25000"/>
+                          </a:schemeClr>
+                        </a:solidFill>
+                        <a:effectLst/>
+                        <a:latin typeface="+mn-lt"/>
+                        <a:ea typeface="+mn-ea"/>
+                        <a:cs typeface="+mn-cs"/>
+                      </a:endParaRPr>
+                    </a:p>
+                  </a:txBody>
+                  <a:tcPr marL="68580" marR="68580" marT="0" marB="0" anchor="ctr">
+                    <a:lnL w="12700" cmpd="sng">
+                      <a:noFill/>
+                      <a:prstDash val="solid"/>
+                    </a:lnL>
+                    <a:lnR w="12700" cmpd="sng">
+                      <a:noFill/>
+                      <a:prstDash val="solid"/>
+                    </a:lnR>
+                    <a:lnT w="9525" cap="flat" cmpd="sng" algn="ctr">
+                      <a:noFill/>
+                      <a:prstDash val="solid"/>
+                    </a:lnT>
+                    <a:lnB w="9525" cap="flat" cmpd="sng" algn="ctr">
+                      <a:solidFill>
+                        <a:srgbClr val="C7C6C1"/>
+                      </a:solidFill>
+                      <a:prstDash val="solid"/>
+                    </a:lnB>
+                    <a:noFill/>
+                  </a:tcPr>
+                </a:tc>
+                <a:tc>
+                  <a:txBody>
+                    <a:bodyPr/>
+                    <a:lstStyle/>
+                    <a:p>
+                      <a:pPr marL="0" algn="l" defTabSz="914400" rtl="0" eaLnBrk="1" latinLnBrk="0" hangingPunct="1">
+                        <a:lnSpc>
+                          <a:spcPct val="115000"/>
+                        </a:lnSpc>
+                        <a:spcAft>
+                          <a:spcPts val="0"/>
+                        </a:spcAft>
+                      </a:pPr>
+                      <a:r>
+                        <a:rPr lang="en-US" sz="2400" b="1" kern="1200" dirty="0">
+                          <a:solidFill>
+                            <a:schemeClr val="tx1">
+                              <a:lumMod val="75000"/>
+                              <a:lumOff val="25000"/>
+                            </a:schemeClr>
+                          </a:solidFill>
+                          <a:effectLst/>
+                          <a:latin typeface="+mn-lt"/>
+                          <a:ea typeface="+mn-ea"/>
+                          <a:cs typeface="+mn-cs"/>
+                        </a:rPr>
+                        <a:t>LHS</a:t>
+                      </a:r>
+                      <a:endParaRPr lang="en-CA" sz="2400" b="1" kern="1200" dirty="0">
+                        <a:solidFill>
+                          <a:schemeClr val="tx1">
+                            <a:lumMod val="75000"/>
+                            <a:lumOff val="25000"/>
+                          </a:schemeClr>
+                        </a:solidFill>
+                        <a:effectLst/>
+                        <a:latin typeface="+mn-lt"/>
+                        <a:ea typeface="+mn-ea"/>
+                        <a:cs typeface="+mn-cs"/>
+                      </a:endParaRPr>
+                    </a:p>
+                  </a:txBody>
+                  <a:tcPr marL="68580" marR="68580" marT="0" marB="0" anchor="ctr">
+                    <a:lnL w="12700" cmpd="sng">
+                      <a:noFill/>
+                      <a:prstDash val="solid"/>
+                    </a:lnL>
+                    <a:lnR w="12700" cmpd="sng">
+                      <a:noFill/>
+                      <a:prstDash val="solid"/>
+                    </a:lnR>
+                    <a:lnT w="9525" cap="flat" cmpd="sng" algn="ctr">
+                      <a:noFill/>
+                      <a:prstDash val="solid"/>
+                    </a:lnT>
+                    <a:lnB w="9525" cap="flat" cmpd="sng" algn="ctr">
+                      <a:solidFill>
+                        <a:srgbClr val="C7C6C1"/>
+                      </a:solidFill>
+                      <a:prstDash val="solid"/>
+                    </a:lnB>
+                    <a:noFill/>
+                  </a:tcPr>
+                </a:tc>
+                <a:tc>
+                  <a:txBody>
+                    <a:bodyPr/>
+                    <a:lstStyle/>
+                    <a:p>
+                      <a:pPr marL="0" algn="l" defTabSz="914400" rtl="0" eaLnBrk="1" latinLnBrk="0" hangingPunct="1">
+                        <a:lnSpc>
+                          <a:spcPct val="115000"/>
+                        </a:lnSpc>
+                        <a:spcAft>
+                          <a:spcPts val="0"/>
+                        </a:spcAft>
+                      </a:pPr>
+                      <a:r>
+                        <a:rPr lang="en-CA" sz="2400" b="1" kern="1200" dirty="0">
+                          <a:solidFill>
+                            <a:schemeClr val="tx1">
+                              <a:lumMod val="75000"/>
+                              <a:lumOff val="25000"/>
+                            </a:schemeClr>
+                          </a:solidFill>
+                          <a:effectLst/>
+                          <a:latin typeface="+mn-lt"/>
+                          <a:ea typeface="+mn-ea"/>
+                          <a:cs typeface="+mn-cs"/>
+                        </a:rPr>
+                        <a:t>Support</a:t>
+                      </a:r>
+                    </a:p>
+                  </a:txBody>
+                  <a:tcPr marL="68580" marR="68580" marT="0" marB="0" anchor="ctr">
+                    <a:lnL w="12700" cmpd="sng">
+                      <a:noFill/>
+                      <a:prstDash val="solid"/>
+                    </a:lnL>
+                    <a:lnR w="12700" cmpd="sng">
+                      <a:noFill/>
+                      <a:prstDash val="solid"/>
+                    </a:lnR>
+                    <a:lnT w="9525" cap="flat" cmpd="sng" algn="ctr">
+                      <a:noFill/>
+                      <a:prstDash val="solid"/>
+                    </a:lnT>
+                    <a:lnB w="9525" cap="flat" cmpd="sng" algn="ctr">
+                      <a:solidFill>
+                        <a:srgbClr val="C7C6C1"/>
+                      </a:solidFill>
+                      <a:prstDash val="solid"/>
+                    </a:lnB>
+                    <a:noFill/>
+                  </a:tcPr>
+                </a:tc>
+                <a:tc>
+                  <a:txBody>
+                    <a:bodyPr/>
+                    <a:lstStyle/>
+                    <a:p>
+                      <a:pPr marL="0" algn="l" defTabSz="914400" rtl="0" eaLnBrk="1" latinLnBrk="0" hangingPunct="1">
+                        <a:lnSpc>
+                          <a:spcPct val="115000"/>
+                        </a:lnSpc>
+                        <a:spcAft>
+                          <a:spcPts val="0"/>
+                        </a:spcAft>
+                      </a:pPr>
+                      <a:r>
+                        <a:rPr lang="en-US" sz="2400" b="1" kern="1200" dirty="0">
+                          <a:solidFill>
+                            <a:schemeClr val="tx1">
+                              <a:lumMod val="75000"/>
+                              <a:lumOff val="25000"/>
+                            </a:schemeClr>
+                          </a:solidFill>
+                          <a:effectLst/>
+                          <a:latin typeface="+mn-lt"/>
+                          <a:ea typeface="+mn-ea"/>
+                          <a:cs typeface="+mn-cs"/>
+                        </a:rPr>
+                        <a:t>Confidence</a:t>
+                      </a:r>
+                      <a:endParaRPr lang="en-CA" sz="2400" b="1" kern="1200" dirty="0">
+                        <a:solidFill>
+                          <a:schemeClr val="tx1">
+                            <a:lumMod val="75000"/>
+                            <a:lumOff val="25000"/>
+                          </a:schemeClr>
+                        </a:solidFill>
+                        <a:effectLst/>
+                        <a:latin typeface="+mn-lt"/>
+                        <a:ea typeface="+mn-ea"/>
+                        <a:cs typeface="+mn-cs"/>
+                      </a:endParaRPr>
+                    </a:p>
+                  </a:txBody>
+                  <a:tcPr marL="68580" marR="68580" marT="0" marB="0" anchor="ctr">
+                    <a:lnL w="12700" cmpd="sng">
+                      <a:noFill/>
+                      <a:prstDash val="solid"/>
+                    </a:lnL>
+                    <a:lnR w="12700" cmpd="sng">
+                      <a:noFill/>
+                      <a:prstDash val="solid"/>
+                    </a:lnR>
+                    <a:lnT w="9525" cap="flat" cmpd="sng" algn="ctr">
+                      <a:noFill/>
+                      <a:prstDash val="solid"/>
+                    </a:lnT>
+                    <a:lnB w="9525" cap="flat" cmpd="sng" algn="ctr">
+                      <a:solidFill>
+                        <a:srgbClr val="C7C6C1"/>
+                      </a:solidFill>
+                      <a:prstDash val="solid"/>
+                    </a:lnB>
+                    <a:noFill/>
+                  </a:tcPr>
+                </a:tc>
+                <a:tc>
+                  <a:txBody>
+                    <a:bodyPr/>
+                    <a:lstStyle/>
+                    <a:p>
+                      <a:pPr marL="0" algn="l" defTabSz="914400" rtl="0" eaLnBrk="1" latinLnBrk="0" hangingPunct="1">
+                        <a:lnSpc>
+                          <a:spcPct val="115000"/>
+                        </a:lnSpc>
+                        <a:spcAft>
+                          <a:spcPts val="0"/>
+                        </a:spcAft>
+                      </a:pPr>
+                      <a:r>
+                        <a:rPr lang="en-US" sz="2400" b="1" kern="1200" dirty="0">
+                          <a:solidFill>
+                            <a:schemeClr val="tx1">
+                              <a:lumMod val="75000"/>
+                              <a:lumOff val="25000"/>
+                            </a:schemeClr>
+                          </a:solidFill>
+                          <a:effectLst/>
+                          <a:latin typeface="+mn-lt"/>
+                          <a:ea typeface="+mn-ea"/>
+                          <a:cs typeface="+mn-cs"/>
+                        </a:rPr>
+                        <a:t>Lift</a:t>
+                      </a:r>
+                      <a:endParaRPr lang="en-CA" sz="2400" b="1" kern="1200" dirty="0">
+                        <a:solidFill>
+                          <a:schemeClr val="tx1">
+                            <a:lumMod val="75000"/>
+                            <a:lumOff val="25000"/>
+                          </a:schemeClr>
+                        </a:solidFill>
+                        <a:effectLst/>
+                        <a:latin typeface="+mn-lt"/>
+                        <a:ea typeface="+mn-ea"/>
+                        <a:cs typeface="+mn-cs"/>
+                      </a:endParaRPr>
+                    </a:p>
+                  </a:txBody>
+                  <a:tcPr marL="68580" marR="68580" marT="0" marB="0" anchor="ctr">
+                    <a:lnL w="12700" cmpd="sng">
+                      <a:noFill/>
+                      <a:prstDash val="solid"/>
+                    </a:lnL>
+                    <a:lnR w="12700" cmpd="sng">
+                      <a:noFill/>
+                      <a:prstDash val="solid"/>
+                    </a:lnR>
+                    <a:lnT w="9525" cap="flat" cmpd="sng" algn="ctr">
+                      <a:noFill/>
+                      <a:prstDash val="solid"/>
+                    </a:lnT>
+                    <a:lnB w="9525" cap="flat" cmpd="sng" algn="ctr">
+                      <a:solidFill>
+                        <a:srgbClr val="C7C6C1"/>
+                      </a:solidFill>
+                      <a:prstDash val="solid"/>
+                    </a:lnB>
+                    <a:noFill/>
+                  </a:tcPr>
+                </a:tc>
+                <a:tc>
+                  <a:txBody>
+                    <a:bodyPr/>
+                    <a:lstStyle/>
+                    <a:p>
+                      <a:pPr marL="0" algn="l" defTabSz="914400" rtl="0" eaLnBrk="1" latinLnBrk="0" hangingPunct="1">
+                        <a:lnSpc>
+                          <a:spcPct val="115000"/>
+                        </a:lnSpc>
+                        <a:spcAft>
+                          <a:spcPts val="0"/>
+                        </a:spcAft>
+                      </a:pPr>
+                      <a:r>
+                        <a:rPr lang="en-US" sz="2400" b="1" kern="1200" dirty="0">
+                          <a:solidFill>
+                            <a:schemeClr val="tx1">
+                              <a:lumMod val="75000"/>
+                              <a:lumOff val="25000"/>
+                            </a:schemeClr>
+                          </a:solidFill>
+                          <a:effectLst/>
+                          <a:latin typeface="+mn-lt"/>
+                          <a:ea typeface="+mn-ea"/>
+                          <a:cs typeface="+mn-cs"/>
+                        </a:rPr>
+                        <a:t>Count</a:t>
+                      </a:r>
+                      <a:endParaRPr lang="en-CA" sz="2400" b="1" kern="1200" dirty="0">
+                        <a:solidFill>
+                          <a:schemeClr val="tx1">
+                            <a:lumMod val="75000"/>
+                            <a:lumOff val="25000"/>
+                          </a:schemeClr>
+                        </a:solidFill>
+                        <a:effectLst/>
+                        <a:latin typeface="+mn-lt"/>
+                        <a:ea typeface="+mn-ea"/>
+                        <a:cs typeface="+mn-cs"/>
+                      </a:endParaRPr>
+                    </a:p>
+                  </a:txBody>
+                  <a:tcPr marL="68580" marR="68580" marT="0" marB="0" anchor="ctr">
+                    <a:lnL w="12700" cmpd="sng">
+                      <a:noFill/>
+                      <a:prstDash val="solid"/>
+                    </a:lnL>
+                    <a:lnR w="12700" cmpd="sng">
+                      <a:noFill/>
+                      <a:prstDash val="solid"/>
+                    </a:lnR>
+                    <a:lnT w="9525" cap="flat" cmpd="sng" algn="ctr">
+                      <a:noFill/>
+                      <a:prstDash val="solid"/>
+                    </a:lnT>
+                    <a:lnB w="9525" cap="flat" cmpd="sng" algn="ctr">
+                      <a:solidFill>
+                        <a:srgbClr val="C7C6C1"/>
+                      </a:solidFill>
+                      <a:prstDash val="solid"/>
+                    </a:lnB>
+                    <a:noFill/>
+                  </a:tcPr>
+                </a:tc>
+                <a:extLst>
+                  <a:ext uri="{0D108BD9-81ED-4DB2-BD59-A6C34878D82A}">
+                    <a16:rowId xmlns:a16="http://schemas.microsoft.com/office/drawing/2014/main" val="3378592721"/>
+                  </a:ext>
+                </a:extLst>
+              </a:tr>
+              <a:tr h="833108">
+                <a:tc>
+                  <a:txBody>
+                    <a:bodyPr/>
+                    <a:lstStyle/>
+                    <a:p>
+                      <a:pPr marL="0" algn="l" defTabSz="914400" rtl="0" eaLnBrk="1" latinLnBrk="0" hangingPunct="1">
+                        <a:lnSpc>
+                          <a:spcPct val="115000"/>
+                        </a:lnSpc>
+                        <a:spcAft>
+                          <a:spcPts val="0"/>
+                        </a:spcAft>
+                      </a:pPr>
+                      <a:r>
+                        <a:rPr lang="en-US" sz="1700" b="0" kern="1200" dirty="0">
+                          <a:solidFill>
+                            <a:schemeClr val="tx1">
+                              <a:lumMod val="75000"/>
+                              <a:lumOff val="25000"/>
+                            </a:schemeClr>
+                          </a:solidFill>
+                          <a:effectLst/>
+                          <a:latin typeface="+mn-lt"/>
+                          <a:ea typeface="+mn-ea"/>
+                          <a:cs typeface="+mn-cs"/>
+                        </a:rPr>
+                        <a:t>1</a:t>
+                      </a:r>
+                      <a:endParaRPr lang="en-CA" sz="1700" b="0" kern="1200" dirty="0">
+                        <a:solidFill>
+                          <a:schemeClr val="tx1">
+                            <a:lumMod val="75000"/>
+                            <a:lumOff val="25000"/>
+                          </a:schemeClr>
+                        </a:solidFill>
+                        <a:effectLst/>
+                        <a:latin typeface="+mn-lt"/>
+                        <a:ea typeface="+mn-ea"/>
+                        <a:cs typeface="+mn-cs"/>
+                      </a:endParaRPr>
+                    </a:p>
+                  </a:txBody>
+                  <a:tcPr marL="68580" marR="68580" marT="0" marB="0" anchor="ctr">
+                    <a:lnL w="12700" cmpd="sng">
+                      <a:noFill/>
+                      <a:prstDash val="solid"/>
+                    </a:lnL>
+                    <a:lnR w="12700" cmpd="sng">
+                      <a:noFill/>
+                      <a:prstDash val="solid"/>
+                    </a:lnR>
+                    <a:lnT w="9525" cap="flat" cmpd="sng" algn="ctr">
+                      <a:solidFill>
+                        <a:srgbClr val="C7C6C1"/>
+                      </a:solidFill>
+                      <a:prstDash val="solid"/>
+                      <a:round/>
+                      <a:headEnd type="none" w="med" len="med"/>
+                      <a:tailEnd type="none" w="med" len="med"/>
+                    </a:lnT>
+                    <a:lnB w="9525" cap="flat" cmpd="sng" algn="ctr">
+                      <a:solidFill>
+                        <a:srgbClr val="C7C6C1"/>
+                      </a:solidFill>
+                      <a:prstDash val="solid"/>
+                    </a:lnB>
+                    <a:noFill/>
+                  </a:tcPr>
+                </a:tc>
+                <a:tc>
+                  <a:txBody>
+                    <a:bodyPr/>
+                    <a:lstStyle/>
+                    <a:p>
+                      <a:pPr marL="0" algn="l" defTabSz="914400" rtl="0" eaLnBrk="1" latinLnBrk="0" hangingPunct="1">
+                        <a:lnSpc>
+                          <a:spcPct val="115000"/>
+                        </a:lnSpc>
+                        <a:spcAft>
+                          <a:spcPts val="0"/>
+                        </a:spcAft>
+                      </a:pPr>
+                      <a:r>
+                        <a:rPr lang="en-US" sz="1700" b="0" kern="1200" dirty="0" err="1">
+                          <a:solidFill>
+                            <a:schemeClr val="tx1">
+                              <a:lumMod val="75000"/>
+                              <a:lumOff val="25000"/>
+                            </a:schemeClr>
+                          </a:solidFill>
+                          <a:effectLst/>
+                          <a:latin typeface="+mn-lt"/>
+                          <a:ea typeface="+mn-ea"/>
+                          <a:cs typeface="+mn-cs"/>
+                        </a:rPr>
+                        <a:t>Immigrant.admission.category</a:t>
+                      </a:r>
+                      <a:r>
+                        <a:rPr lang="en-US" sz="1700" b="0" kern="1200" dirty="0">
+                          <a:solidFill>
+                            <a:schemeClr val="tx1">
+                              <a:lumMod val="75000"/>
+                              <a:lumOff val="25000"/>
+                            </a:schemeClr>
+                          </a:solidFill>
+                          <a:effectLst/>
+                          <a:latin typeface="+mn-lt"/>
+                          <a:ea typeface="+mn-ea"/>
+                          <a:cs typeface="+mn-cs"/>
+                        </a:rPr>
+                        <a:t> = Canadian experience class, principal applicants                                </a:t>
+                      </a:r>
+                      <a:endParaRPr lang="en-CA" sz="1700" b="0" kern="1200" dirty="0">
+                        <a:solidFill>
+                          <a:schemeClr val="tx1">
+                            <a:lumMod val="75000"/>
+                            <a:lumOff val="25000"/>
+                          </a:schemeClr>
+                        </a:solidFill>
+                        <a:effectLst/>
+                        <a:latin typeface="+mn-lt"/>
+                        <a:ea typeface="+mn-ea"/>
+                        <a:cs typeface="+mn-cs"/>
+                      </a:endParaRPr>
+                    </a:p>
+                  </a:txBody>
+                  <a:tcPr marL="68580" marR="68580" marT="0" marB="0" anchor="ctr">
+                    <a:lnL w="12700" cmpd="sng">
+                      <a:noFill/>
+                      <a:prstDash val="solid"/>
+                    </a:lnL>
+                    <a:lnR w="12700" cmpd="sng">
+                      <a:noFill/>
+                      <a:prstDash val="solid"/>
+                    </a:lnR>
+                    <a:lnT w="9525" cap="flat" cmpd="sng" algn="ctr">
+                      <a:solidFill>
+                        <a:srgbClr val="C7C6C1"/>
+                      </a:solidFill>
+                      <a:prstDash val="solid"/>
+                      <a:round/>
+                      <a:headEnd type="none" w="med" len="med"/>
+                      <a:tailEnd type="none" w="med" len="med"/>
+                    </a:lnT>
+                    <a:lnB w="9525" cap="flat" cmpd="sng" algn="ctr">
+                      <a:solidFill>
+                        <a:srgbClr val="C7C6C1"/>
+                      </a:solidFill>
+                      <a:prstDash val="solid"/>
+                    </a:lnB>
+                    <a:noFill/>
+                  </a:tcPr>
+                </a:tc>
+                <a:tc>
+                  <a:txBody>
+                    <a:bodyPr/>
+                    <a:lstStyle/>
+                    <a:p>
+                      <a:pPr marL="0" algn="l" defTabSz="914400" rtl="0" eaLnBrk="1" latinLnBrk="0" hangingPunct="1">
+                        <a:lnSpc>
+                          <a:spcPct val="115000"/>
+                        </a:lnSpc>
+                        <a:spcAft>
+                          <a:spcPts val="0"/>
+                        </a:spcAft>
+                      </a:pPr>
+                      <a:r>
+                        <a:rPr lang="en-CA" sz="1700" b="0" kern="1200" dirty="0">
+                          <a:solidFill>
+                            <a:schemeClr val="tx1">
+                              <a:lumMod val="75000"/>
+                              <a:lumOff val="25000"/>
+                            </a:schemeClr>
+                          </a:solidFill>
+                          <a:effectLst/>
+                          <a:latin typeface="+mn-lt"/>
+                          <a:ea typeface="+mn-ea"/>
+                          <a:cs typeface="+mn-cs"/>
+                        </a:rPr>
+                        <a:t>0.02613312</a:t>
+                      </a:r>
+                    </a:p>
+                  </a:txBody>
+                  <a:tcPr marL="68580" marR="68580" marT="0" marB="0" anchor="ctr">
+                    <a:lnL w="12700" cmpd="sng">
+                      <a:noFill/>
+                      <a:prstDash val="solid"/>
+                    </a:lnL>
+                    <a:lnR w="12700" cmpd="sng">
+                      <a:noFill/>
+                      <a:prstDash val="solid"/>
+                    </a:lnR>
+                    <a:lnT w="9525" cap="flat" cmpd="sng" algn="ctr">
+                      <a:solidFill>
+                        <a:srgbClr val="C7C6C1"/>
+                      </a:solidFill>
+                      <a:prstDash val="solid"/>
+                      <a:round/>
+                      <a:headEnd type="none" w="med" len="med"/>
+                      <a:tailEnd type="none" w="med" len="med"/>
+                    </a:lnT>
+                    <a:lnB w="9525" cap="flat" cmpd="sng" algn="ctr">
+                      <a:solidFill>
+                        <a:srgbClr val="C7C6C1"/>
+                      </a:solidFill>
+                      <a:prstDash val="solid"/>
+                    </a:lnB>
+                    <a:noFill/>
+                  </a:tcPr>
+                </a:tc>
+                <a:tc>
+                  <a:txBody>
+                    <a:bodyPr/>
+                    <a:lstStyle/>
+                    <a:p>
+                      <a:pPr marL="0" algn="l" defTabSz="914400" rtl="0" eaLnBrk="1" latinLnBrk="0" hangingPunct="1">
+                        <a:lnSpc>
+                          <a:spcPct val="115000"/>
+                        </a:lnSpc>
+                        <a:spcAft>
+                          <a:spcPts val="0"/>
+                        </a:spcAft>
+                      </a:pPr>
+                      <a:r>
+                        <a:rPr lang="en-CA" sz="1700" b="0" kern="1200" dirty="0">
+                          <a:solidFill>
+                            <a:schemeClr val="tx1">
+                              <a:lumMod val="75000"/>
+                              <a:lumOff val="25000"/>
+                            </a:schemeClr>
+                          </a:solidFill>
+                          <a:effectLst/>
+                          <a:latin typeface="+mn-lt"/>
+                          <a:ea typeface="+mn-ea"/>
+                          <a:cs typeface="+mn-cs"/>
+                        </a:rPr>
+                        <a:t>0.7356322</a:t>
+                      </a:r>
+                    </a:p>
+                  </a:txBody>
+                  <a:tcPr marL="68580" marR="68580" marT="0" marB="0" anchor="ctr">
+                    <a:lnL w="12700" cmpd="sng">
+                      <a:noFill/>
+                      <a:prstDash val="solid"/>
+                    </a:lnL>
+                    <a:lnR w="12700" cmpd="sng">
+                      <a:noFill/>
+                      <a:prstDash val="solid"/>
+                    </a:lnR>
+                    <a:lnT w="9525" cap="flat" cmpd="sng" algn="ctr">
+                      <a:solidFill>
+                        <a:srgbClr val="C7C6C1"/>
+                      </a:solidFill>
+                      <a:prstDash val="solid"/>
+                      <a:round/>
+                      <a:headEnd type="none" w="med" len="med"/>
+                      <a:tailEnd type="none" w="med" len="med"/>
+                    </a:lnT>
+                    <a:lnB w="9525" cap="flat" cmpd="sng" algn="ctr">
+                      <a:solidFill>
+                        <a:srgbClr val="C7C6C1"/>
+                      </a:solidFill>
+                      <a:prstDash val="solid"/>
+                    </a:lnB>
+                    <a:noFill/>
+                  </a:tcPr>
+                </a:tc>
+                <a:tc>
+                  <a:txBody>
+                    <a:bodyPr/>
+                    <a:lstStyle/>
+                    <a:p>
+                      <a:pPr marL="0" algn="l" defTabSz="914400" rtl="0" eaLnBrk="1" latinLnBrk="0" hangingPunct="1">
+                        <a:lnSpc>
+                          <a:spcPct val="115000"/>
+                        </a:lnSpc>
+                        <a:spcAft>
+                          <a:spcPts val="0"/>
+                        </a:spcAft>
+                      </a:pPr>
+                      <a:r>
+                        <a:rPr lang="en-CA" sz="1700" b="0" kern="1200" dirty="0">
+                          <a:solidFill>
+                            <a:schemeClr val="tx1">
+                              <a:lumMod val="75000"/>
+                              <a:lumOff val="25000"/>
+                            </a:schemeClr>
+                          </a:solidFill>
+                          <a:effectLst/>
+                          <a:latin typeface="+mn-lt"/>
+                          <a:ea typeface="+mn-ea"/>
+                          <a:cs typeface="+mn-cs"/>
+                        </a:rPr>
+                        <a:t>7.41384</a:t>
+                      </a:r>
+                    </a:p>
+                  </a:txBody>
+                  <a:tcPr marL="68580" marR="68580" marT="0" marB="0" anchor="ctr">
+                    <a:lnL w="12700" cmpd="sng">
+                      <a:noFill/>
+                      <a:prstDash val="solid"/>
+                    </a:lnL>
+                    <a:lnR w="12700" cmpd="sng">
+                      <a:noFill/>
+                      <a:prstDash val="solid"/>
+                    </a:lnR>
+                    <a:lnT w="9525" cap="flat" cmpd="sng" algn="ctr">
+                      <a:solidFill>
+                        <a:srgbClr val="C7C6C1"/>
+                      </a:solidFill>
+                      <a:prstDash val="solid"/>
+                      <a:round/>
+                      <a:headEnd type="none" w="med" len="med"/>
+                      <a:tailEnd type="none" w="med" len="med"/>
+                    </a:lnT>
+                    <a:lnB w="9525" cap="flat" cmpd="sng" algn="ctr">
+                      <a:solidFill>
+                        <a:srgbClr val="C7C6C1"/>
+                      </a:solidFill>
+                      <a:prstDash val="solid"/>
+                    </a:lnB>
+                    <a:noFill/>
+                  </a:tcPr>
+                </a:tc>
+                <a:tc>
+                  <a:txBody>
+                    <a:bodyPr/>
+                    <a:lstStyle/>
+                    <a:p>
+                      <a:pPr marL="0" algn="l" defTabSz="914400" rtl="0" eaLnBrk="1" latinLnBrk="0" hangingPunct="1">
+                        <a:lnSpc>
+                          <a:spcPct val="115000"/>
+                        </a:lnSpc>
+                        <a:spcAft>
+                          <a:spcPts val="0"/>
+                        </a:spcAft>
+                      </a:pPr>
+                      <a:r>
+                        <a:rPr lang="en-CA" sz="1700" b="0" kern="1200" dirty="0">
+                          <a:solidFill>
+                            <a:schemeClr val="tx1">
+                              <a:lumMod val="75000"/>
+                              <a:lumOff val="25000"/>
+                            </a:schemeClr>
+                          </a:solidFill>
+                          <a:effectLst/>
+                          <a:latin typeface="+mn-lt"/>
+                          <a:ea typeface="+mn-ea"/>
+                          <a:cs typeface="+mn-cs"/>
+                        </a:rPr>
+                        <a:t>128</a:t>
+                      </a:r>
+                    </a:p>
+                  </a:txBody>
+                  <a:tcPr marL="68580" marR="68580" marT="0" marB="0" anchor="ctr">
+                    <a:lnL w="12700" cmpd="sng">
+                      <a:noFill/>
+                      <a:prstDash val="solid"/>
+                    </a:lnL>
+                    <a:lnR w="12700" cmpd="sng">
+                      <a:noFill/>
+                      <a:prstDash val="solid"/>
+                    </a:lnR>
+                    <a:lnT w="9525" cap="flat" cmpd="sng" algn="ctr">
+                      <a:solidFill>
+                        <a:srgbClr val="C7C6C1"/>
+                      </a:solidFill>
+                      <a:prstDash val="solid"/>
+                      <a:round/>
+                      <a:headEnd type="none" w="med" len="med"/>
+                      <a:tailEnd type="none" w="med" len="med"/>
+                    </a:lnT>
+                    <a:lnB w="9525" cap="flat" cmpd="sng" algn="ctr">
+                      <a:solidFill>
+                        <a:srgbClr val="C7C6C1"/>
+                      </a:solidFill>
+                      <a:prstDash val="solid"/>
+                    </a:lnB>
+                    <a:noFill/>
+                  </a:tcPr>
+                </a:tc>
+                <a:extLst>
+                  <a:ext uri="{0D108BD9-81ED-4DB2-BD59-A6C34878D82A}">
+                    <a16:rowId xmlns:a16="http://schemas.microsoft.com/office/drawing/2014/main" val="3086154305"/>
+                  </a:ext>
+                </a:extLst>
+              </a:tr>
+              <a:tr h="871911">
+                <a:tc>
+                  <a:txBody>
+                    <a:bodyPr/>
+                    <a:lstStyle/>
+                    <a:p>
+                      <a:pPr marL="0" algn="l" defTabSz="914400" rtl="0" eaLnBrk="1" latinLnBrk="0" hangingPunct="1">
+                        <a:lnSpc>
+                          <a:spcPct val="115000"/>
+                        </a:lnSpc>
+                        <a:spcAft>
+                          <a:spcPts val="0"/>
+                        </a:spcAft>
+                      </a:pPr>
+                      <a:r>
+                        <a:rPr lang="en-US" sz="1700" b="0" kern="1200">
+                          <a:solidFill>
+                            <a:schemeClr val="tx1">
+                              <a:lumMod val="75000"/>
+                              <a:lumOff val="25000"/>
+                            </a:schemeClr>
+                          </a:solidFill>
+                          <a:effectLst/>
+                          <a:latin typeface="+mn-lt"/>
+                          <a:ea typeface="+mn-ea"/>
+                          <a:cs typeface="+mn-cs"/>
+                        </a:rPr>
+                        <a:t>2</a:t>
+                      </a:r>
+                      <a:endParaRPr lang="en-CA" sz="1700" b="0" kern="1200">
+                        <a:solidFill>
+                          <a:schemeClr val="tx1">
+                            <a:lumMod val="75000"/>
+                            <a:lumOff val="25000"/>
+                          </a:schemeClr>
+                        </a:solidFill>
+                        <a:effectLst/>
+                        <a:latin typeface="+mn-lt"/>
+                        <a:ea typeface="+mn-ea"/>
+                        <a:cs typeface="+mn-cs"/>
+                      </a:endParaRPr>
+                    </a:p>
+                  </a:txBody>
+                  <a:tcPr marL="68580" marR="68580" marT="0" marB="0" anchor="ctr">
+                    <a:lnL w="12700" cmpd="sng">
+                      <a:noFill/>
+                      <a:prstDash val="solid"/>
+                    </a:lnL>
+                    <a:lnR w="12700" cmpd="sng">
+                      <a:noFill/>
+                      <a:prstDash val="solid"/>
+                    </a:lnR>
+                    <a:lnT w="9525" cap="flat" cmpd="sng" algn="ctr">
+                      <a:solidFill>
+                        <a:srgbClr val="C7C6C1"/>
+                      </a:solidFill>
+                      <a:prstDash val="solid"/>
+                      <a:round/>
+                      <a:headEnd type="none" w="med" len="med"/>
+                      <a:tailEnd type="none" w="med" len="med"/>
+                    </a:lnT>
+                    <a:lnB w="9525" cap="flat" cmpd="sng" algn="ctr">
+                      <a:solidFill>
+                        <a:srgbClr val="C7C6C1"/>
+                      </a:solidFill>
+                      <a:prstDash val="solid"/>
+                    </a:lnB>
+                    <a:noFill/>
+                  </a:tcPr>
+                </a:tc>
+                <a:tc>
+                  <a:txBody>
+                    <a:bodyPr/>
+                    <a:lstStyle/>
+                    <a:p>
+                      <a:pPr marL="0" algn="l" defTabSz="914400" rtl="0" eaLnBrk="1" latinLnBrk="0" hangingPunct="1">
+                        <a:lnSpc>
+                          <a:spcPct val="115000"/>
+                        </a:lnSpc>
+                        <a:spcAft>
+                          <a:spcPts val="0"/>
+                        </a:spcAft>
+                      </a:pPr>
+                      <a:r>
+                        <a:rPr lang="en-US" sz="1700" b="0" kern="1200" dirty="0" err="1">
+                          <a:solidFill>
+                            <a:schemeClr val="tx1">
+                              <a:lumMod val="75000"/>
+                              <a:lumOff val="25000"/>
+                            </a:schemeClr>
+                          </a:solidFill>
+                          <a:effectLst/>
+                          <a:latin typeface="+mn-lt"/>
+                          <a:ea typeface="+mn-ea"/>
+                          <a:cs typeface="+mn-cs"/>
+                        </a:rPr>
+                        <a:t>Immigrant.admission.category</a:t>
+                      </a:r>
+                      <a:r>
+                        <a:rPr lang="en-US" sz="1700" b="0" kern="1200" dirty="0">
+                          <a:solidFill>
+                            <a:schemeClr val="tx1">
+                              <a:lumMod val="75000"/>
+                              <a:lumOff val="25000"/>
+                            </a:schemeClr>
+                          </a:solidFill>
+                          <a:effectLst/>
+                          <a:latin typeface="+mn-lt"/>
+                          <a:ea typeface="+mn-ea"/>
+                          <a:cs typeface="+mn-cs"/>
+                        </a:rPr>
+                        <a:t> = Skilled workers, principal applicants</a:t>
+                      </a:r>
+                      <a:endParaRPr lang="en-CA" sz="1700" b="0" kern="1200" dirty="0">
+                        <a:solidFill>
+                          <a:schemeClr val="tx1">
+                            <a:lumMod val="75000"/>
+                            <a:lumOff val="25000"/>
+                          </a:schemeClr>
+                        </a:solidFill>
+                        <a:effectLst/>
+                        <a:latin typeface="+mn-lt"/>
+                        <a:ea typeface="+mn-ea"/>
+                        <a:cs typeface="+mn-cs"/>
+                      </a:endParaRPr>
+                    </a:p>
+                  </a:txBody>
+                  <a:tcPr marL="68580" marR="68580" marT="0" marB="0" anchor="ctr">
+                    <a:lnL w="12700" cmpd="sng">
+                      <a:noFill/>
+                      <a:prstDash val="solid"/>
+                    </a:lnL>
+                    <a:lnR w="12700" cmpd="sng">
+                      <a:noFill/>
+                      <a:prstDash val="solid"/>
+                    </a:lnR>
+                    <a:lnT w="9525" cap="flat" cmpd="sng" algn="ctr">
+                      <a:solidFill>
+                        <a:srgbClr val="C7C6C1"/>
+                      </a:solidFill>
+                      <a:prstDash val="solid"/>
+                      <a:round/>
+                      <a:headEnd type="none" w="med" len="med"/>
+                      <a:tailEnd type="none" w="med" len="med"/>
+                    </a:lnT>
+                    <a:lnB w="9525" cap="flat" cmpd="sng" algn="ctr">
+                      <a:solidFill>
+                        <a:srgbClr val="C7C6C1"/>
+                      </a:solidFill>
+                      <a:prstDash val="solid"/>
+                    </a:lnB>
+                    <a:noFill/>
+                  </a:tcPr>
+                </a:tc>
+                <a:tc>
+                  <a:txBody>
+                    <a:bodyPr/>
+                    <a:lstStyle/>
+                    <a:p>
+                      <a:pPr marL="0" algn="l" defTabSz="914400" rtl="0" eaLnBrk="1" latinLnBrk="0" hangingPunct="1">
+                        <a:lnSpc>
+                          <a:spcPct val="115000"/>
+                        </a:lnSpc>
+                        <a:spcAft>
+                          <a:spcPts val="0"/>
+                        </a:spcAft>
+                      </a:pPr>
+                      <a:r>
+                        <a:rPr lang="en-CA" sz="1700" b="0" kern="1200" dirty="0">
+                          <a:solidFill>
+                            <a:schemeClr val="tx1">
+                              <a:lumMod val="75000"/>
+                              <a:lumOff val="25000"/>
+                            </a:schemeClr>
+                          </a:solidFill>
+                          <a:effectLst/>
+                          <a:latin typeface="+mn-lt"/>
+                          <a:ea typeface="+mn-ea"/>
+                          <a:cs typeface="+mn-cs"/>
+                        </a:rPr>
+                        <a:t>0.02062066</a:t>
+                      </a:r>
+                    </a:p>
+                  </a:txBody>
+                  <a:tcPr marL="68580" marR="68580" marT="0" marB="0" anchor="ctr">
+                    <a:lnL w="12700" cmpd="sng">
+                      <a:noFill/>
+                      <a:prstDash val="solid"/>
+                    </a:lnL>
+                    <a:lnR w="12700" cmpd="sng">
+                      <a:noFill/>
+                      <a:prstDash val="solid"/>
+                    </a:lnR>
+                    <a:lnT w="9525" cap="flat" cmpd="sng" algn="ctr">
+                      <a:solidFill>
+                        <a:srgbClr val="C7C6C1"/>
+                      </a:solidFill>
+                      <a:prstDash val="solid"/>
+                      <a:round/>
+                      <a:headEnd type="none" w="med" len="med"/>
+                      <a:tailEnd type="none" w="med" len="med"/>
+                    </a:lnT>
+                    <a:lnB w="9525" cap="flat" cmpd="sng" algn="ctr">
+                      <a:solidFill>
+                        <a:srgbClr val="C7C6C1"/>
+                      </a:solidFill>
+                      <a:prstDash val="solid"/>
+                    </a:lnB>
+                    <a:noFill/>
+                  </a:tcPr>
+                </a:tc>
+                <a:tc>
+                  <a:txBody>
+                    <a:bodyPr/>
+                    <a:lstStyle/>
+                    <a:p>
+                      <a:pPr marL="0" algn="l" defTabSz="914400" rtl="0" eaLnBrk="1" latinLnBrk="0" hangingPunct="1">
+                        <a:lnSpc>
+                          <a:spcPct val="115000"/>
+                        </a:lnSpc>
+                        <a:spcAft>
+                          <a:spcPts val="0"/>
+                        </a:spcAft>
+                      </a:pPr>
+                      <a:r>
+                        <a:rPr lang="en-CA" sz="1700" b="0" kern="1200" dirty="0">
+                          <a:solidFill>
+                            <a:schemeClr val="tx1">
+                              <a:lumMod val="75000"/>
+                              <a:lumOff val="25000"/>
+                            </a:schemeClr>
+                          </a:solidFill>
+                          <a:effectLst/>
+                          <a:latin typeface="+mn-lt"/>
+                          <a:ea typeface="+mn-ea"/>
+                          <a:cs typeface="+mn-cs"/>
+                        </a:rPr>
+                        <a:t>0.5401070</a:t>
+                      </a:r>
+                    </a:p>
+                  </a:txBody>
+                  <a:tcPr marL="68580" marR="68580" marT="0" marB="0" anchor="ctr">
+                    <a:lnL w="12700" cmpd="sng">
+                      <a:noFill/>
+                      <a:prstDash val="solid"/>
+                    </a:lnL>
+                    <a:lnR w="12700" cmpd="sng">
+                      <a:noFill/>
+                      <a:prstDash val="solid"/>
+                    </a:lnR>
+                    <a:lnT w="9525" cap="flat" cmpd="sng" algn="ctr">
+                      <a:solidFill>
+                        <a:srgbClr val="C7C6C1"/>
+                      </a:solidFill>
+                      <a:prstDash val="solid"/>
+                      <a:round/>
+                      <a:headEnd type="none" w="med" len="med"/>
+                      <a:tailEnd type="none" w="med" len="med"/>
+                    </a:lnT>
+                    <a:lnB w="9525" cap="flat" cmpd="sng" algn="ctr">
+                      <a:solidFill>
+                        <a:srgbClr val="C7C6C1"/>
+                      </a:solidFill>
+                      <a:prstDash val="solid"/>
+                    </a:lnB>
+                    <a:noFill/>
+                  </a:tcPr>
+                </a:tc>
+                <a:tc>
+                  <a:txBody>
+                    <a:bodyPr/>
+                    <a:lstStyle/>
+                    <a:p>
+                      <a:pPr marL="0" algn="l" defTabSz="914400" rtl="0" eaLnBrk="1" latinLnBrk="0" hangingPunct="1">
+                        <a:lnSpc>
+                          <a:spcPct val="115000"/>
+                        </a:lnSpc>
+                        <a:spcAft>
+                          <a:spcPts val="0"/>
+                        </a:spcAft>
+                      </a:pPr>
+                      <a:r>
+                        <a:rPr lang="en-US" sz="1700" b="0" kern="1200">
+                          <a:solidFill>
+                            <a:schemeClr val="tx1">
+                              <a:lumMod val="75000"/>
+                              <a:lumOff val="25000"/>
+                            </a:schemeClr>
+                          </a:solidFill>
+                          <a:effectLst/>
+                          <a:latin typeface="+mn-lt"/>
+                          <a:ea typeface="+mn-ea"/>
+                          <a:cs typeface="+mn-cs"/>
+                        </a:rPr>
+                        <a:t>5.44330</a:t>
+                      </a:r>
+                      <a:endParaRPr lang="en-CA" sz="1700" b="0" kern="1200">
+                        <a:solidFill>
+                          <a:schemeClr val="tx1">
+                            <a:lumMod val="75000"/>
+                            <a:lumOff val="25000"/>
+                          </a:schemeClr>
+                        </a:solidFill>
+                        <a:effectLst/>
+                        <a:latin typeface="+mn-lt"/>
+                        <a:ea typeface="+mn-ea"/>
+                        <a:cs typeface="+mn-cs"/>
+                      </a:endParaRPr>
+                    </a:p>
+                  </a:txBody>
+                  <a:tcPr marL="68580" marR="68580" marT="0" marB="0" anchor="ctr">
+                    <a:lnL w="12700" cmpd="sng">
+                      <a:noFill/>
+                      <a:prstDash val="solid"/>
+                    </a:lnL>
+                    <a:lnR w="12700" cmpd="sng">
+                      <a:noFill/>
+                      <a:prstDash val="solid"/>
+                    </a:lnR>
+                    <a:lnT w="9525" cap="flat" cmpd="sng" algn="ctr">
+                      <a:solidFill>
+                        <a:srgbClr val="C7C6C1"/>
+                      </a:solidFill>
+                      <a:prstDash val="solid"/>
+                      <a:round/>
+                      <a:headEnd type="none" w="med" len="med"/>
+                      <a:tailEnd type="none" w="med" len="med"/>
+                    </a:lnT>
+                    <a:lnB w="9525" cap="flat" cmpd="sng" algn="ctr">
+                      <a:solidFill>
+                        <a:srgbClr val="C7C6C1"/>
+                      </a:solidFill>
+                      <a:prstDash val="solid"/>
+                    </a:lnB>
+                    <a:noFill/>
+                  </a:tcPr>
+                </a:tc>
+                <a:tc>
+                  <a:txBody>
+                    <a:bodyPr/>
+                    <a:lstStyle/>
+                    <a:p>
+                      <a:pPr marL="0" algn="l" defTabSz="914400" rtl="0" eaLnBrk="1" latinLnBrk="0" hangingPunct="1">
+                        <a:lnSpc>
+                          <a:spcPct val="115000"/>
+                        </a:lnSpc>
+                        <a:spcAft>
+                          <a:spcPts val="0"/>
+                        </a:spcAft>
+                      </a:pPr>
+                      <a:r>
+                        <a:rPr lang="en-US" sz="1700" b="0" kern="1200" dirty="0">
+                          <a:solidFill>
+                            <a:schemeClr val="tx1">
+                              <a:lumMod val="75000"/>
+                              <a:lumOff val="25000"/>
+                            </a:schemeClr>
+                          </a:solidFill>
+                          <a:effectLst/>
+                          <a:latin typeface="+mn-lt"/>
+                          <a:ea typeface="+mn-ea"/>
+                          <a:cs typeface="+mn-cs"/>
+                        </a:rPr>
+                        <a:t>101</a:t>
+                      </a:r>
+                      <a:endParaRPr lang="en-CA" sz="1700" b="0" kern="1200" dirty="0">
+                        <a:solidFill>
+                          <a:schemeClr val="tx1">
+                            <a:lumMod val="75000"/>
+                            <a:lumOff val="25000"/>
+                          </a:schemeClr>
+                        </a:solidFill>
+                        <a:effectLst/>
+                        <a:latin typeface="+mn-lt"/>
+                        <a:ea typeface="+mn-ea"/>
+                        <a:cs typeface="+mn-cs"/>
+                      </a:endParaRPr>
+                    </a:p>
+                  </a:txBody>
+                  <a:tcPr marL="68580" marR="68580" marT="0" marB="0" anchor="ctr">
+                    <a:lnL w="12700" cmpd="sng">
+                      <a:noFill/>
+                      <a:prstDash val="solid"/>
+                    </a:lnL>
+                    <a:lnR w="12700" cmpd="sng">
+                      <a:noFill/>
+                      <a:prstDash val="solid"/>
+                    </a:lnR>
+                    <a:lnT w="9525" cap="flat" cmpd="sng" algn="ctr">
+                      <a:solidFill>
+                        <a:srgbClr val="C7C6C1"/>
+                      </a:solidFill>
+                      <a:prstDash val="solid"/>
+                      <a:round/>
+                      <a:headEnd type="none" w="med" len="med"/>
+                      <a:tailEnd type="none" w="med" len="med"/>
+                    </a:lnT>
+                    <a:lnB w="9525" cap="flat" cmpd="sng" algn="ctr">
+                      <a:solidFill>
+                        <a:srgbClr val="C7C6C1"/>
+                      </a:solidFill>
+                      <a:prstDash val="solid"/>
+                    </a:lnB>
+                    <a:noFill/>
+                  </a:tcPr>
+                </a:tc>
+                <a:extLst>
+                  <a:ext uri="{0D108BD9-81ED-4DB2-BD59-A6C34878D82A}">
+                    <a16:rowId xmlns:a16="http://schemas.microsoft.com/office/drawing/2014/main" val="688651926"/>
+                  </a:ext>
+                </a:extLst>
+              </a:tr>
+              <a:tr h="1028423">
+                <a:tc>
+                  <a:txBody>
+                    <a:bodyPr/>
+                    <a:lstStyle/>
+                    <a:p>
+                      <a:pPr marL="0" algn="l" defTabSz="914400" rtl="0" eaLnBrk="1" latinLnBrk="0" hangingPunct="1">
+                        <a:lnSpc>
+                          <a:spcPct val="115000"/>
+                        </a:lnSpc>
+                        <a:spcAft>
+                          <a:spcPts val="0"/>
+                        </a:spcAft>
+                      </a:pPr>
+                      <a:r>
+                        <a:rPr lang="en-US" sz="1700" b="0" kern="1200" dirty="0">
+                          <a:solidFill>
+                            <a:schemeClr val="tx1">
+                              <a:lumMod val="75000"/>
+                              <a:lumOff val="25000"/>
+                            </a:schemeClr>
+                          </a:solidFill>
+                          <a:effectLst/>
+                          <a:latin typeface="+mn-lt"/>
+                          <a:ea typeface="+mn-ea"/>
+                          <a:cs typeface="+mn-cs"/>
+                        </a:rPr>
+                        <a:t>3</a:t>
+                      </a:r>
+                      <a:endParaRPr lang="en-CA" sz="1700" b="0" kern="1200" dirty="0">
+                        <a:solidFill>
+                          <a:schemeClr val="tx1">
+                            <a:lumMod val="75000"/>
+                            <a:lumOff val="25000"/>
+                          </a:schemeClr>
+                        </a:solidFill>
+                        <a:effectLst/>
+                        <a:latin typeface="+mn-lt"/>
+                        <a:ea typeface="+mn-ea"/>
+                        <a:cs typeface="+mn-cs"/>
+                      </a:endParaRPr>
+                    </a:p>
+                  </a:txBody>
+                  <a:tcPr marL="68580" marR="68580" marT="0" marB="0" anchor="ctr">
+                    <a:lnL w="12700" cmpd="sng">
+                      <a:noFill/>
+                      <a:prstDash val="solid"/>
+                    </a:lnL>
+                    <a:lnR w="12700" cmpd="sng">
+                      <a:noFill/>
+                      <a:prstDash val="solid"/>
+                    </a:lnR>
+                    <a:lnT w="9525" cap="flat" cmpd="sng" algn="ctr">
+                      <a:solidFill>
+                        <a:srgbClr val="C7C6C1"/>
+                      </a:solidFill>
+                      <a:prstDash val="solid"/>
+                      <a:round/>
+                      <a:headEnd type="none" w="med" len="med"/>
+                      <a:tailEnd type="none" w="med" len="med"/>
+                    </a:lnT>
+                    <a:lnB w="9525" cap="flat" cmpd="sng" algn="ctr">
+                      <a:solidFill>
+                        <a:srgbClr val="C7C6C1"/>
+                      </a:solidFill>
+                      <a:prstDash val="solid"/>
+                    </a:lnB>
+                    <a:noFill/>
+                  </a:tcPr>
+                </a:tc>
+                <a:tc>
+                  <a:txBody>
+                    <a:bodyPr/>
+                    <a:lstStyle/>
+                    <a:p>
+                      <a:pPr marL="0" algn="l" defTabSz="914400" rtl="0" eaLnBrk="1" latinLnBrk="0" hangingPunct="1">
+                        <a:lnSpc>
+                          <a:spcPct val="115000"/>
+                        </a:lnSpc>
+                        <a:spcAft>
+                          <a:spcPts val="0"/>
+                        </a:spcAft>
+                      </a:pPr>
+                      <a:r>
+                        <a:rPr lang="en-US" sz="1700" b="0" kern="1200" dirty="0" err="1">
+                          <a:solidFill>
+                            <a:schemeClr val="tx1">
+                              <a:lumMod val="75000"/>
+                              <a:lumOff val="25000"/>
+                            </a:schemeClr>
+                          </a:solidFill>
+                          <a:effectLst/>
+                          <a:latin typeface="+mn-lt"/>
+                          <a:ea typeface="+mn-ea"/>
+                          <a:cs typeface="+mn-cs"/>
+                        </a:rPr>
+                        <a:t>Family.status</a:t>
+                      </a:r>
+                      <a:r>
+                        <a:rPr lang="en-US" sz="1700" b="0" kern="1200" dirty="0">
+                          <a:solidFill>
+                            <a:schemeClr val="tx1">
+                              <a:lumMod val="75000"/>
+                              <a:lumOff val="25000"/>
+                            </a:schemeClr>
+                          </a:solidFill>
+                          <a:effectLst/>
+                          <a:latin typeface="+mn-lt"/>
+                          <a:ea typeface="+mn-ea"/>
+                          <a:cs typeface="+mn-cs"/>
+                        </a:rPr>
+                        <a:t> = Principal applicants</a:t>
+                      </a:r>
+                      <a:endParaRPr lang="en-CA" sz="1700" b="0" kern="1200" dirty="0">
+                        <a:solidFill>
+                          <a:schemeClr val="tx1">
+                            <a:lumMod val="75000"/>
+                            <a:lumOff val="25000"/>
+                          </a:schemeClr>
+                        </a:solidFill>
+                        <a:effectLst/>
+                        <a:latin typeface="+mn-lt"/>
+                        <a:ea typeface="+mn-ea"/>
+                        <a:cs typeface="+mn-cs"/>
+                      </a:endParaRPr>
+                    </a:p>
+                    <a:p>
+                      <a:pPr marL="0" algn="l" defTabSz="914400" rtl="0" eaLnBrk="1" latinLnBrk="0" hangingPunct="1">
+                        <a:lnSpc>
+                          <a:spcPct val="115000"/>
+                        </a:lnSpc>
+                        <a:spcAft>
+                          <a:spcPts val="0"/>
+                        </a:spcAft>
+                      </a:pPr>
+                      <a:r>
+                        <a:rPr lang="en-US" sz="1700" b="0" kern="1200" dirty="0" err="1">
+                          <a:solidFill>
+                            <a:schemeClr val="tx1">
+                              <a:lumMod val="75000"/>
+                              <a:lumOff val="25000"/>
+                            </a:schemeClr>
+                          </a:solidFill>
+                          <a:effectLst/>
+                          <a:latin typeface="+mn-lt"/>
+                          <a:ea typeface="+mn-ea"/>
+                          <a:cs typeface="+mn-cs"/>
+                        </a:rPr>
+                        <a:t>Immigrant.admission.category</a:t>
+                      </a:r>
+                      <a:r>
+                        <a:rPr lang="en-US" sz="1700" b="0" kern="1200" dirty="0">
+                          <a:solidFill>
+                            <a:schemeClr val="tx1">
+                              <a:lumMod val="75000"/>
+                              <a:lumOff val="25000"/>
+                            </a:schemeClr>
+                          </a:solidFill>
+                          <a:effectLst/>
+                          <a:latin typeface="+mn-lt"/>
+                          <a:ea typeface="+mn-ea"/>
+                          <a:cs typeface="+mn-cs"/>
+                        </a:rPr>
+                        <a:t> = Canadian experience class, principal applicants</a:t>
+                      </a:r>
+                      <a:endParaRPr lang="en-CA" sz="1700" b="0" kern="1200" dirty="0">
+                        <a:solidFill>
+                          <a:schemeClr val="tx1">
+                            <a:lumMod val="75000"/>
+                            <a:lumOff val="25000"/>
+                          </a:schemeClr>
+                        </a:solidFill>
+                        <a:effectLst/>
+                        <a:latin typeface="+mn-lt"/>
+                        <a:ea typeface="+mn-ea"/>
+                        <a:cs typeface="+mn-cs"/>
+                      </a:endParaRPr>
+                    </a:p>
+                  </a:txBody>
+                  <a:tcPr marL="68580" marR="68580" marT="0" marB="0" anchor="ctr">
+                    <a:lnL w="12700" cmpd="sng">
+                      <a:noFill/>
+                      <a:prstDash val="solid"/>
+                    </a:lnL>
+                    <a:lnR w="12700" cmpd="sng">
+                      <a:noFill/>
+                      <a:prstDash val="solid"/>
+                    </a:lnR>
+                    <a:lnT w="9525" cap="flat" cmpd="sng" algn="ctr">
+                      <a:solidFill>
+                        <a:srgbClr val="C7C6C1"/>
+                      </a:solidFill>
+                      <a:prstDash val="solid"/>
+                      <a:round/>
+                      <a:headEnd type="none" w="med" len="med"/>
+                      <a:tailEnd type="none" w="med" len="med"/>
+                    </a:lnT>
+                    <a:lnB w="9525" cap="flat" cmpd="sng" algn="ctr">
+                      <a:solidFill>
+                        <a:srgbClr val="C7C6C1"/>
+                      </a:solidFill>
+                      <a:prstDash val="solid"/>
+                    </a:lnB>
+                    <a:noFill/>
+                  </a:tcPr>
+                </a:tc>
+                <a:tc>
+                  <a:txBody>
+                    <a:bodyPr/>
+                    <a:lstStyle/>
+                    <a:p>
+                      <a:pPr marL="0" algn="l" defTabSz="914400" rtl="0" eaLnBrk="1" latinLnBrk="0" hangingPunct="1">
+                        <a:lnSpc>
+                          <a:spcPct val="115000"/>
+                        </a:lnSpc>
+                        <a:spcAft>
+                          <a:spcPts val="0"/>
+                        </a:spcAft>
+                      </a:pPr>
+                      <a:r>
+                        <a:rPr lang="en-US" sz="1700" b="0" kern="1200">
+                          <a:solidFill>
+                            <a:schemeClr val="tx1">
+                              <a:lumMod val="75000"/>
+                              <a:lumOff val="25000"/>
+                            </a:schemeClr>
+                          </a:solidFill>
+                          <a:effectLst/>
+                          <a:latin typeface="+mn-lt"/>
+                          <a:ea typeface="+mn-ea"/>
+                          <a:cs typeface="+mn-cs"/>
+                        </a:rPr>
+                        <a:t>0.02613312</a:t>
+                      </a:r>
+                      <a:endParaRPr lang="en-CA" sz="1700" b="0" kern="1200">
+                        <a:solidFill>
+                          <a:schemeClr val="tx1">
+                            <a:lumMod val="75000"/>
+                            <a:lumOff val="25000"/>
+                          </a:schemeClr>
+                        </a:solidFill>
+                        <a:effectLst/>
+                        <a:latin typeface="+mn-lt"/>
+                        <a:ea typeface="+mn-ea"/>
+                        <a:cs typeface="+mn-cs"/>
+                      </a:endParaRPr>
+                    </a:p>
+                  </a:txBody>
+                  <a:tcPr marL="68580" marR="68580" marT="0" marB="0" anchor="ctr">
+                    <a:lnL w="12700" cmpd="sng">
+                      <a:noFill/>
+                      <a:prstDash val="solid"/>
+                    </a:lnL>
+                    <a:lnR w="12700" cmpd="sng">
+                      <a:noFill/>
+                      <a:prstDash val="solid"/>
+                    </a:lnR>
+                    <a:lnT w="9525" cap="flat" cmpd="sng" algn="ctr">
+                      <a:solidFill>
+                        <a:srgbClr val="C7C6C1"/>
+                      </a:solidFill>
+                      <a:prstDash val="solid"/>
+                      <a:round/>
+                      <a:headEnd type="none" w="med" len="med"/>
+                      <a:tailEnd type="none" w="med" len="med"/>
+                    </a:lnT>
+                    <a:lnB w="9525" cap="flat" cmpd="sng" algn="ctr">
+                      <a:solidFill>
+                        <a:srgbClr val="C7C6C1"/>
+                      </a:solidFill>
+                      <a:prstDash val="solid"/>
+                    </a:lnB>
+                    <a:noFill/>
+                  </a:tcPr>
+                </a:tc>
+                <a:tc>
+                  <a:txBody>
+                    <a:bodyPr/>
+                    <a:lstStyle/>
+                    <a:p>
+                      <a:pPr marL="0" algn="l" defTabSz="914400" rtl="0" eaLnBrk="1" latinLnBrk="0" hangingPunct="1">
+                        <a:lnSpc>
+                          <a:spcPct val="115000"/>
+                        </a:lnSpc>
+                        <a:spcAft>
+                          <a:spcPts val="0"/>
+                        </a:spcAft>
+                      </a:pPr>
+                      <a:r>
+                        <a:rPr lang="en-US" sz="1700" b="0" kern="1200" dirty="0">
+                          <a:solidFill>
+                            <a:schemeClr val="tx1">
+                              <a:lumMod val="75000"/>
+                              <a:lumOff val="25000"/>
+                            </a:schemeClr>
+                          </a:solidFill>
+                          <a:effectLst/>
+                          <a:latin typeface="+mn-lt"/>
+                          <a:ea typeface="+mn-ea"/>
+                          <a:cs typeface="+mn-cs"/>
+                        </a:rPr>
+                        <a:t>0.7356322</a:t>
+                      </a:r>
+                      <a:endParaRPr lang="en-CA" sz="1700" b="0" kern="1200" dirty="0">
+                        <a:solidFill>
+                          <a:schemeClr val="tx1">
+                            <a:lumMod val="75000"/>
+                            <a:lumOff val="25000"/>
+                          </a:schemeClr>
+                        </a:solidFill>
+                        <a:effectLst/>
+                        <a:latin typeface="+mn-lt"/>
+                        <a:ea typeface="+mn-ea"/>
+                        <a:cs typeface="+mn-cs"/>
+                      </a:endParaRPr>
+                    </a:p>
+                  </a:txBody>
+                  <a:tcPr marL="68580" marR="68580" marT="0" marB="0" anchor="ctr">
+                    <a:lnL w="12700" cmpd="sng">
+                      <a:noFill/>
+                      <a:prstDash val="solid"/>
+                    </a:lnL>
+                    <a:lnR w="12700" cmpd="sng">
+                      <a:noFill/>
+                      <a:prstDash val="solid"/>
+                    </a:lnR>
+                    <a:lnT w="9525" cap="flat" cmpd="sng" algn="ctr">
+                      <a:solidFill>
+                        <a:srgbClr val="C7C6C1"/>
+                      </a:solidFill>
+                      <a:prstDash val="solid"/>
+                      <a:round/>
+                      <a:headEnd type="none" w="med" len="med"/>
+                      <a:tailEnd type="none" w="med" len="med"/>
+                    </a:lnT>
+                    <a:lnB w="9525" cap="flat" cmpd="sng" algn="ctr">
+                      <a:solidFill>
+                        <a:srgbClr val="C7C6C1"/>
+                      </a:solidFill>
+                      <a:prstDash val="solid"/>
+                    </a:lnB>
+                    <a:noFill/>
+                  </a:tcPr>
+                </a:tc>
+                <a:tc>
+                  <a:txBody>
+                    <a:bodyPr/>
+                    <a:lstStyle/>
+                    <a:p>
+                      <a:pPr marL="0" algn="l" defTabSz="914400" rtl="0" eaLnBrk="1" latinLnBrk="0" hangingPunct="1">
+                        <a:lnSpc>
+                          <a:spcPct val="115000"/>
+                        </a:lnSpc>
+                        <a:spcAft>
+                          <a:spcPts val="0"/>
+                        </a:spcAft>
+                      </a:pPr>
+                      <a:r>
+                        <a:rPr lang="en-US" sz="1700" b="0" kern="1200" dirty="0">
+                          <a:solidFill>
+                            <a:schemeClr val="tx1">
+                              <a:lumMod val="75000"/>
+                              <a:lumOff val="25000"/>
+                            </a:schemeClr>
+                          </a:solidFill>
+                          <a:effectLst/>
+                          <a:latin typeface="+mn-lt"/>
+                          <a:ea typeface="+mn-ea"/>
+                          <a:cs typeface="+mn-cs"/>
+                        </a:rPr>
+                        <a:t>7.41384</a:t>
+                      </a:r>
+                      <a:endParaRPr lang="en-CA" sz="1700" b="0" kern="1200" dirty="0">
+                        <a:solidFill>
+                          <a:schemeClr val="tx1">
+                            <a:lumMod val="75000"/>
+                            <a:lumOff val="25000"/>
+                          </a:schemeClr>
+                        </a:solidFill>
+                        <a:effectLst/>
+                        <a:latin typeface="+mn-lt"/>
+                        <a:ea typeface="+mn-ea"/>
+                        <a:cs typeface="+mn-cs"/>
+                      </a:endParaRPr>
+                    </a:p>
+                  </a:txBody>
+                  <a:tcPr marL="68580" marR="68580" marT="0" marB="0" anchor="ctr">
+                    <a:lnL w="12700" cmpd="sng">
+                      <a:noFill/>
+                      <a:prstDash val="solid"/>
+                    </a:lnL>
+                    <a:lnR w="12700" cmpd="sng">
+                      <a:noFill/>
+                      <a:prstDash val="solid"/>
+                    </a:lnR>
+                    <a:lnT w="9525" cap="flat" cmpd="sng" algn="ctr">
+                      <a:solidFill>
+                        <a:srgbClr val="C7C6C1"/>
+                      </a:solidFill>
+                      <a:prstDash val="solid"/>
+                      <a:round/>
+                      <a:headEnd type="none" w="med" len="med"/>
+                      <a:tailEnd type="none" w="med" len="med"/>
+                    </a:lnT>
+                    <a:lnB w="9525" cap="flat" cmpd="sng" algn="ctr">
+                      <a:solidFill>
+                        <a:srgbClr val="C7C6C1"/>
+                      </a:solidFill>
+                      <a:prstDash val="solid"/>
+                    </a:lnB>
+                    <a:noFill/>
+                  </a:tcPr>
+                </a:tc>
+                <a:tc>
+                  <a:txBody>
+                    <a:bodyPr/>
+                    <a:lstStyle/>
+                    <a:p>
+                      <a:pPr marL="0" algn="l" defTabSz="914400" rtl="0" eaLnBrk="1" latinLnBrk="0" hangingPunct="1">
+                        <a:lnSpc>
+                          <a:spcPct val="115000"/>
+                        </a:lnSpc>
+                        <a:spcAft>
+                          <a:spcPts val="0"/>
+                        </a:spcAft>
+                      </a:pPr>
+                      <a:r>
+                        <a:rPr lang="en-US" sz="1700" b="0" kern="1200" dirty="0">
+                          <a:solidFill>
+                            <a:schemeClr val="tx1">
+                              <a:lumMod val="75000"/>
+                              <a:lumOff val="25000"/>
+                            </a:schemeClr>
+                          </a:solidFill>
+                          <a:effectLst/>
+                          <a:latin typeface="+mn-lt"/>
+                          <a:ea typeface="+mn-ea"/>
+                          <a:cs typeface="+mn-cs"/>
+                        </a:rPr>
+                        <a:t>128</a:t>
+                      </a:r>
+                      <a:endParaRPr lang="en-CA" sz="1700" b="0" kern="1200" dirty="0">
+                        <a:solidFill>
+                          <a:schemeClr val="tx1">
+                            <a:lumMod val="75000"/>
+                            <a:lumOff val="25000"/>
+                          </a:schemeClr>
+                        </a:solidFill>
+                        <a:effectLst/>
+                        <a:latin typeface="+mn-lt"/>
+                        <a:ea typeface="+mn-ea"/>
+                        <a:cs typeface="+mn-cs"/>
+                      </a:endParaRPr>
+                    </a:p>
+                  </a:txBody>
+                  <a:tcPr marL="68580" marR="68580" marT="0" marB="0" anchor="ctr">
+                    <a:lnL w="12700" cmpd="sng">
+                      <a:noFill/>
+                      <a:prstDash val="solid"/>
+                    </a:lnL>
+                    <a:lnR w="12700" cmpd="sng">
+                      <a:noFill/>
+                      <a:prstDash val="solid"/>
+                    </a:lnR>
+                    <a:lnT w="9525" cap="flat" cmpd="sng" algn="ctr">
+                      <a:solidFill>
+                        <a:srgbClr val="C7C6C1"/>
+                      </a:solidFill>
+                      <a:prstDash val="solid"/>
+                      <a:round/>
+                      <a:headEnd type="none" w="med" len="med"/>
+                      <a:tailEnd type="none" w="med" len="med"/>
+                    </a:lnT>
+                    <a:lnB w="9525" cap="flat" cmpd="sng" algn="ctr">
+                      <a:solidFill>
+                        <a:srgbClr val="C7C6C1"/>
+                      </a:solidFill>
+                      <a:prstDash val="solid"/>
+                    </a:lnB>
+                    <a:noFill/>
+                  </a:tcPr>
+                </a:tc>
+                <a:extLst>
+                  <a:ext uri="{0D108BD9-81ED-4DB2-BD59-A6C34878D82A}">
+                    <a16:rowId xmlns:a16="http://schemas.microsoft.com/office/drawing/2014/main" val="2237681342"/>
+                  </a:ext>
+                </a:extLst>
+              </a:tr>
+              <a:tr h="986589">
+                <a:tc>
+                  <a:txBody>
+                    <a:bodyPr/>
+                    <a:lstStyle/>
+                    <a:p>
+                      <a:pPr marL="0" algn="l" defTabSz="914400" rtl="0" eaLnBrk="1" latinLnBrk="0" hangingPunct="1">
+                        <a:lnSpc>
+                          <a:spcPct val="115000"/>
+                        </a:lnSpc>
+                        <a:spcAft>
+                          <a:spcPts val="0"/>
+                        </a:spcAft>
+                      </a:pPr>
+                      <a:r>
+                        <a:rPr lang="en-US" sz="1700" b="0" kern="1200" dirty="0">
+                          <a:solidFill>
+                            <a:schemeClr val="tx1">
+                              <a:lumMod val="75000"/>
+                              <a:lumOff val="25000"/>
+                            </a:schemeClr>
+                          </a:solidFill>
+                          <a:effectLst/>
+                          <a:latin typeface="+mn-lt"/>
+                          <a:ea typeface="+mn-ea"/>
+                          <a:cs typeface="+mn-cs"/>
+                        </a:rPr>
+                        <a:t>4</a:t>
+                      </a:r>
+                      <a:endParaRPr lang="en-CA" sz="1700" b="0" kern="1200" dirty="0">
+                        <a:solidFill>
+                          <a:schemeClr val="tx1">
+                            <a:lumMod val="75000"/>
+                            <a:lumOff val="25000"/>
+                          </a:schemeClr>
+                        </a:solidFill>
+                        <a:effectLst/>
+                        <a:latin typeface="+mn-lt"/>
+                        <a:ea typeface="+mn-ea"/>
+                        <a:cs typeface="+mn-cs"/>
+                      </a:endParaRPr>
+                    </a:p>
+                  </a:txBody>
+                  <a:tcPr marL="68580" marR="68580" marT="0" marB="0" anchor="ctr">
+                    <a:lnL w="19050" cap="flat" cmpd="sng" algn="ctr">
+                      <a:noFill/>
+                      <a:prstDash val="solid"/>
+                    </a:lnL>
+                    <a:lnR w="9525" cap="flat" cmpd="sng" algn="ctr">
+                      <a:solidFill>
+                        <a:srgbClr val="C7C6C1"/>
+                      </a:solidFill>
+                      <a:prstDash val="solid"/>
+                    </a:lnR>
+                    <a:lnT w="9525" cap="flat" cmpd="sng" algn="ctr">
+                      <a:solidFill>
+                        <a:srgbClr val="C7C6C1"/>
+                      </a:solidFill>
+                      <a:prstDash val="solid"/>
+                    </a:lnT>
+                    <a:lnB w="12700" cmpd="sng">
+                      <a:noFill/>
+                      <a:prstDash val="solid"/>
+                    </a:lnB>
+                    <a:noFill/>
+                  </a:tcPr>
+                </a:tc>
+                <a:tc>
+                  <a:txBody>
+                    <a:bodyPr/>
+                    <a:lstStyle/>
+                    <a:p>
+                      <a:pPr marL="0" algn="l" defTabSz="914400" rtl="0" eaLnBrk="1" latinLnBrk="0" hangingPunct="1">
+                        <a:lnSpc>
+                          <a:spcPct val="115000"/>
+                        </a:lnSpc>
+                        <a:spcAft>
+                          <a:spcPts val="0"/>
+                        </a:spcAft>
+                      </a:pPr>
+                      <a:r>
+                        <a:rPr lang="en-US" sz="1700" b="0" kern="1200" dirty="0" err="1">
+                          <a:solidFill>
+                            <a:schemeClr val="tx1">
+                              <a:lumMod val="75000"/>
+                              <a:lumOff val="25000"/>
+                            </a:schemeClr>
+                          </a:solidFill>
+                          <a:effectLst/>
+                          <a:latin typeface="+mn-lt"/>
+                          <a:ea typeface="+mn-ea"/>
+                          <a:cs typeface="+mn-cs"/>
+                        </a:rPr>
+                        <a:t>Family.status</a:t>
+                      </a:r>
+                      <a:r>
+                        <a:rPr lang="en-US" sz="1700" b="0" kern="1200" dirty="0">
+                          <a:solidFill>
+                            <a:schemeClr val="tx1">
+                              <a:lumMod val="75000"/>
+                              <a:lumOff val="25000"/>
+                            </a:schemeClr>
+                          </a:solidFill>
+                          <a:effectLst/>
+                          <a:latin typeface="+mn-lt"/>
+                          <a:ea typeface="+mn-ea"/>
+                          <a:cs typeface="+mn-cs"/>
+                        </a:rPr>
+                        <a:t> = Principal applicants</a:t>
+                      </a:r>
+                      <a:endParaRPr lang="en-CA" sz="1700" b="0" kern="1200" dirty="0">
+                        <a:solidFill>
+                          <a:schemeClr val="tx1">
+                            <a:lumMod val="75000"/>
+                            <a:lumOff val="25000"/>
+                          </a:schemeClr>
+                        </a:solidFill>
+                        <a:effectLst/>
+                        <a:latin typeface="+mn-lt"/>
+                        <a:ea typeface="+mn-ea"/>
+                        <a:cs typeface="+mn-cs"/>
+                      </a:endParaRPr>
+                    </a:p>
+                    <a:p>
+                      <a:pPr marL="0" algn="l" defTabSz="914400" rtl="0" eaLnBrk="1" latinLnBrk="0" hangingPunct="1">
+                        <a:lnSpc>
+                          <a:spcPct val="115000"/>
+                        </a:lnSpc>
+                        <a:spcAft>
+                          <a:spcPts val="0"/>
+                        </a:spcAft>
+                      </a:pPr>
+                      <a:r>
+                        <a:rPr lang="en-US" sz="1700" b="0" kern="1200" dirty="0" err="1">
+                          <a:solidFill>
+                            <a:schemeClr val="tx1">
+                              <a:lumMod val="75000"/>
+                              <a:lumOff val="25000"/>
+                            </a:schemeClr>
+                          </a:solidFill>
+                          <a:effectLst/>
+                          <a:latin typeface="+mn-lt"/>
+                          <a:ea typeface="+mn-ea"/>
+                          <a:cs typeface="+mn-cs"/>
+                        </a:rPr>
+                        <a:t>Immigrant.admission.category</a:t>
+                      </a:r>
+                      <a:r>
+                        <a:rPr lang="en-US" sz="1700" b="0" kern="1200" dirty="0">
+                          <a:solidFill>
+                            <a:schemeClr val="tx1">
+                              <a:lumMod val="75000"/>
+                              <a:lumOff val="25000"/>
+                            </a:schemeClr>
+                          </a:solidFill>
+                          <a:effectLst/>
+                          <a:latin typeface="+mn-lt"/>
+                          <a:ea typeface="+mn-ea"/>
+                          <a:cs typeface="+mn-cs"/>
+                        </a:rPr>
+                        <a:t> = Skilled workers, principal applicants</a:t>
+                      </a:r>
+                      <a:endParaRPr lang="en-CA" sz="1700" b="0" kern="1200" dirty="0">
+                        <a:solidFill>
+                          <a:schemeClr val="tx1">
+                            <a:lumMod val="75000"/>
+                            <a:lumOff val="25000"/>
+                          </a:schemeClr>
+                        </a:solidFill>
+                        <a:effectLst/>
+                        <a:latin typeface="+mn-lt"/>
+                        <a:ea typeface="+mn-ea"/>
+                        <a:cs typeface="+mn-cs"/>
+                      </a:endParaRPr>
+                    </a:p>
+                  </a:txBody>
+                  <a:tcPr marL="68580" marR="68580" marT="0" marB="0" anchor="ctr">
+                    <a:lnL w="9525" cap="flat" cmpd="sng" algn="ctr">
+                      <a:solidFill>
+                        <a:srgbClr val="C7C6C1"/>
+                      </a:solidFill>
+                      <a:prstDash val="solid"/>
+                    </a:lnL>
+                    <a:lnR w="12700" cmpd="sng">
+                      <a:noFill/>
+                      <a:prstDash val="solid"/>
+                    </a:lnR>
+                    <a:lnT w="9525" cap="flat" cmpd="sng" algn="ctr">
+                      <a:solidFill>
+                        <a:srgbClr val="C7C6C1"/>
+                      </a:solidFill>
+                      <a:prstDash val="solid"/>
+                    </a:lnT>
+                    <a:lnB w="12700" cmpd="sng">
+                      <a:noFill/>
+                      <a:prstDash val="solid"/>
+                    </a:lnB>
+                    <a:noFill/>
+                  </a:tcPr>
+                </a:tc>
+                <a:tc>
+                  <a:txBody>
+                    <a:bodyPr/>
+                    <a:lstStyle/>
+                    <a:p>
+                      <a:pPr marL="0" algn="l" defTabSz="914400" rtl="0" eaLnBrk="1" latinLnBrk="0" hangingPunct="1">
+                        <a:lnSpc>
+                          <a:spcPct val="115000"/>
+                        </a:lnSpc>
+                        <a:spcAft>
+                          <a:spcPts val="0"/>
+                        </a:spcAft>
+                      </a:pPr>
+                      <a:r>
+                        <a:rPr lang="en-US" sz="1700" b="0" kern="1200">
+                          <a:solidFill>
+                            <a:schemeClr val="tx1">
+                              <a:lumMod val="75000"/>
+                              <a:lumOff val="25000"/>
+                            </a:schemeClr>
+                          </a:solidFill>
+                          <a:effectLst/>
+                          <a:latin typeface="+mn-lt"/>
+                          <a:ea typeface="+mn-ea"/>
+                          <a:cs typeface="+mn-cs"/>
+                        </a:rPr>
+                        <a:t>0.02062066</a:t>
+                      </a:r>
+                      <a:endParaRPr lang="en-CA" sz="1700" b="0" kern="1200">
+                        <a:solidFill>
+                          <a:schemeClr val="tx1">
+                            <a:lumMod val="75000"/>
+                            <a:lumOff val="25000"/>
+                          </a:schemeClr>
+                        </a:solidFill>
+                        <a:effectLst/>
+                        <a:latin typeface="+mn-lt"/>
+                        <a:ea typeface="+mn-ea"/>
+                        <a:cs typeface="+mn-cs"/>
+                      </a:endParaRPr>
+                    </a:p>
+                  </a:txBody>
+                  <a:tcPr marL="68580" marR="68580" marT="0" marB="0" anchor="ctr">
+                    <a:lnL w="12700" cmpd="sng">
+                      <a:noFill/>
+                      <a:prstDash val="solid"/>
+                    </a:lnL>
+                    <a:lnR w="12700" cmpd="sng">
+                      <a:noFill/>
+                      <a:prstDash val="solid"/>
+                    </a:lnR>
+                    <a:lnT w="9525" cap="flat" cmpd="sng" algn="ctr">
+                      <a:solidFill>
+                        <a:srgbClr val="C7C6C1"/>
+                      </a:solidFill>
+                      <a:prstDash val="solid"/>
+                    </a:lnT>
+                    <a:lnB w="12700" cmpd="sng">
+                      <a:noFill/>
+                      <a:prstDash val="solid"/>
+                    </a:lnB>
+                    <a:noFill/>
+                  </a:tcPr>
+                </a:tc>
+                <a:tc>
+                  <a:txBody>
+                    <a:bodyPr/>
+                    <a:lstStyle/>
+                    <a:p>
+                      <a:pPr marL="0" algn="l" defTabSz="914400" rtl="0" eaLnBrk="1" latinLnBrk="0" hangingPunct="1">
+                        <a:lnSpc>
+                          <a:spcPct val="115000"/>
+                        </a:lnSpc>
+                        <a:spcAft>
+                          <a:spcPts val="0"/>
+                        </a:spcAft>
+                      </a:pPr>
+                      <a:r>
+                        <a:rPr lang="en-US" sz="1700" b="0" kern="1200">
+                          <a:solidFill>
+                            <a:schemeClr val="tx1">
+                              <a:lumMod val="75000"/>
+                              <a:lumOff val="25000"/>
+                            </a:schemeClr>
+                          </a:solidFill>
+                          <a:effectLst/>
+                          <a:latin typeface="+mn-lt"/>
+                          <a:ea typeface="+mn-ea"/>
+                          <a:cs typeface="+mn-cs"/>
+                        </a:rPr>
+                        <a:t>0.5401070</a:t>
+                      </a:r>
+                      <a:endParaRPr lang="en-CA" sz="1700" b="0" kern="1200">
+                        <a:solidFill>
+                          <a:schemeClr val="tx1">
+                            <a:lumMod val="75000"/>
+                            <a:lumOff val="25000"/>
+                          </a:schemeClr>
+                        </a:solidFill>
+                        <a:effectLst/>
+                        <a:latin typeface="+mn-lt"/>
+                        <a:ea typeface="+mn-ea"/>
+                        <a:cs typeface="+mn-cs"/>
+                      </a:endParaRPr>
+                    </a:p>
+                  </a:txBody>
+                  <a:tcPr marL="68580" marR="68580" marT="0" marB="0" anchor="ctr">
+                    <a:lnL w="12700" cmpd="sng">
+                      <a:noFill/>
+                      <a:prstDash val="solid"/>
+                    </a:lnL>
+                    <a:lnR w="12700" cmpd="sng">
+                      <a:noFill/>
+                      <a:prstDash val="solid"/>
+                    </a:lnR>
+                    <a:lnT w="9525" cap="flat" cmpd="sng" algn="ctr">
+                      <a:solidFill>
+                        <a:srgbClr val="C7C6C1"/>
+                      </a:solidFill>
+                      <a:prstDash val="solid"/>
+                    </a:lnT>
+                    <a:lnB w="12700" cmpd="sng">
+                      <a:noFill/>
+                      <a:prstDash val="solid"/>
+                    </a:lnB>
+                    <a:noFill/>
+                  </a:tcPr>
+                </a:tc>
+                <a:tc>
+                  <a:txBody>
+                    <a:bodyPr/>
+                    <a:lstStyle/>
+                    <a:p>
+                      <a:pPr marL="0" algn="l" defTabSz="914400" rtl="0" eaLnBrk="1" latinLnBrk="0" hangingPunct="1">
+                        <a:lnSpc>
+                          <a:spcPct val="115000"/>
+                        </a:lnSpc>
+                        <a:spcAft>
+                          <a:spcPts val="0"/>
+                        </a:spcAft>
+                      </a:pPr>
+                      <a:r>
+                        <a:rPr lang="en-US" sz="1700" b="0" kern="1200" dirty="0">
+                          <a:solidFill>
+                            <a:schemeClr val="tx1">
+                              <a:lumMod val="75000"/>
+                              <a:lumOff val="25000"/>
+                            </a:schemeClr>
+                          </a:solidFill>
+                          <a:effectLst/>
+                          <a:latin typeface="+mn-lt"/>
+                          <a:ea typeface="+mn-ea"/>
+                          <a:cs typeface="+mn-cs"/>
+                        </a:rPr>
+                        <a:t>5.44330</a:t>
+                      </a:r>
+                      <a:endParaRPr lang="en-CA" sz="1700" b="0" kern="1200" dirty="0">
+                        <a:solidFill>
+                          <a:schemeClr val="tx1">
+                            <a:lumMod val="75000"/>
+                            <a:lumOff val="25000"/>
+                          </a:schemeClr>
+                        </a:solidFill>
+                        <a:effectLst/>
+                        <a:latin typeface="+mn-lt"/>
+                        <a:ea typeface="+mn-ea"/>
+                        <a:cs typeface="+mn-cs"/>
+                      </a:endParaRPr>
+                    </a:p>
+                  </a:txBody>
+                  <a:tcPr marL="68580" marR="68580" marT="0" marB="0" anchor="ctr">
+                    <a:lnL w="12700" cmpd="sng">
+                      <a:noFill/>
+                      <a:prstDash val="solid"/>
+                    </a:lnL>
+                    <a:lnR w="12700" cmpd="sng">
+                      <a:noFill/>
+                      <a:prstDash val="solid"/>
+                    </a:lnR>
+                    <a:lnT w="9525" cap="flat" cmpd="sng" algn="ctr">
+                      <a:solidFill>
+                        <a:srgbClr val="C7C6C1"/>
+                      </a:solidFill>
+                      <a:prstDash val="solid"/>
+                    </a:lnT>
+                    <a:lnB w="12700" cmpd="sng">
+                      <a:noFill/>
+                      <a:prstDash val="solid"/>
+                    </a:lnB>
+                    <a:noFill/>
+                  </a:tcPr>
+                </a:tc>
+                <a:tc>
+                  <a:txBody>
+                    <a:bodyPr/>
+                    <a:lstStyle/>
+                    <a:p>
+                      <a:pPr marL="0" algn="l" defTabSz="914400" rtl="0" eaLnBrk="1" latinLnBrk="0" hangingPunct="1">
+                        <a:lnSpc>
+                          <a:spcPct val="115000"/>
+                        </a:lnSpc>
+                        <a:spcAft>
+                          <a:spcPts val="0"/>
+                        </a:spcAft>
+                      </a:pPr>
+                      <a:r>
+                        <a:rPr lang="en-US" sz="1700" b="0" kern="1200" dirty="0">
+                          <a:solidFill>
+                            <a:schemeClr val="tx1">
+                              <a:lumMod val="75000"/>
+                              <a:lumOff val="25000"/>
+                            </a:schemeClr>
+                          </a:solidFill>
+                          <a:effectLst/>
+                          <a:latin typeface="+mn-lt"/>
+                          <a:ea typeface="+mn-ea"/>
+                          <a:cs typeface="+mn-cs"/>
+                        </a:rPr>
+                        <a:t>101</a:t>
+                      </a:r>
+                      <a:endParaRPr lang="en-CA" sz="1700" b="0" kern="1200" dirty="0">
+                        <a:solidFill>
+                          <a:schemeClr val="tx1">
+                            <a:lumMod val="75000"/>
+                            <a:lumOff val="25000"/>
+                          </a:schemeClr>
+                        </a:solidFill>
+                        <a:effectLst/>
+                        <a:latin typeface="+mn-lt"/>
+                        <a:ea typeface="+mn-ea"/>
+                        <a:cs typeface="+mn-cs"/>
+                      </a:endParaRPr>
+                    </a:p>
+                  </a:txBody>
+                  <a:tcPr marL="68580" marR="68580" marT="0" marB="0" anchor="ctr">
+                    <a:lnL w="12700" cmpd="sng">
+                      <a:noFill/>
+                      <a:prstDash val="solid"/>
+                    </a:lnL>
+                    <a:lnR w="12700" cmpd="sng">
+                      <a:noFill/>
+                      <a:prstDash val="solid"/>
+                    </a:lnR>
+                    <a:lnT w="9525" cap="flat" cmpd="sng" algn="ctr">
+                      <a:solidFill>
+                        <a:srgbClr val="C7C6C1"/>
+                      </a:solidFill>
+                      <a:prstDash val="solid"/>
+                    </a:lnT>
+                    <a:lnB w="12700" cmpd="sng">
+                      <a:noFill/>
+                      <a:prstDash val="solid"/>
+                    </a:lnB>
+                    <a:noFill/>
+                  </a:tcPr>
+                </a:tc>
+                <a:extLst>
+                  <a:ext uri="{0D108BD9-81ED-4DB2-BD59-A6C34878D82A}">
+                    <a16:rowId xmlns:a16="http://schemas.microsoft.com/office/drawing/2014/main" val="3777189939"/>
+                  </a:ext>
+                </a:extLst>
+              </a:tr>
+            </a:tbl>
+          </a:graphicData>
+        </a:graphic>
+      </p:graphicFrame>
     </p:spTree>
     <p:extLst>
       <p:ext uri="{BB962C8B-B14F-4D97-AF65-F5344CB8AC3E}">
-        <p14:creationId xmlns:p14="http://schemas.microsoft.com/office/powerpoint/2010/main" val="1438835665"/>
+        <p14:creationId xmlns:p14="http://schemas.microsoft.com/office/powerpoint/2010/main" val="294559527"/>
       </p:ext>
     </p:extLst>
   </p:cSld>

</xml_diff>